<commit_message>
Checked for observation disparity in the k-means code and simple changes to other codes
</commit_message>
<xml_diff>
--- a/ARIMAX.pptx
+++ b/ARIMAX.pptx
@@ -8,15 +8,23 @@
     <p:sldId id="256" r:id="rId2"/>
     <p:sldId id="257" r:id="rId3"/>
     <p:sldId id="258" r:id="rId4"/>
-    <p:sldId id="259" r:id="rId5"/>
-    <p:sldId id="260" r:id="rId6"/>
-    <p:sldId id="261" r:id="rId7"/>
-    <p:sldId id="265" r:id="rId8"/>
-    <p:sldId id="262" r:id="rId9"/>
-    <p:sldId id="263" r:id="rId10"/>
-    <p:sldId id="266" r:id="rId11"/>
-    <p:sldId id="267" r:id="rId12"/>
-    <p:sldId id="268" r:id="rId13"/>
+    <p:sldId id="269" r:id="rId5"/>
+    <p:sldId id="270" r:id="rId6"/>
+    <p:sldId id="259" r:id="rId7"/>
+    <p:sldId id="260" r:id="rId8"/>
+    <p:sldId id="261" r:id="rId9"/>
+    <p:sldId id="274" r:id="rId10"/>
+    <p:sldId id="271" r:id="rId11"/>
+    <p:sldId id="272" r:id="rId12"/>
+    <p:sldId id="273" r:id="rId13"/>
+    <p:sldId id="275" r:id="rId14"/>
+    <p:sldId id="276" r:id="rId15"/>
+    <p:sldId id="265" r:id="rId16"/>
+    <p:sldId id="262" r:id="rId17"/>
+    <p:sldId id="263" r:id="rId18"/>
+    <p:sldId id="266" r:id="rId19"/>
+    <p:sldId id="267" r:id="rId20"/>
+    <p:sldId id="268" r:id="rId21"/>
   </p:sldIdLst>
   <p:sldSz cx="12192000" cy="6858000"/>
   <p:notesSz cx="6858000" cy="9144000"/>
@@ -118,19 +126,35 @@
   <p:extLst>
     <p:ext uri="{521415D9-36F7-43E2-AB2F-B90AF26B5E84}">
       <p14:sectionLst xmlns:p14="http://schemas.microsoft.com/office/powerpoint/2010/main">
-        <p14:section name="Default Section" id="{D8E4E8CF-86A7-7747-B84A-0E0F11E0D2BC}">
+        <p14:section name="Intro" id="{D8E4E8CF-86A7-7747-B84A-0E0F11E0D2BC}">
           <p14:sldIdLst>
             <p14:sldId id="256"/>
             <p14:sldId id="257"/>
             <p14:sldId id="258"/>
+            <p14:sldId id="269"/>
+            <p14:sldId id="270"/>
             <p14:sldId id="259"/>
+          </p14:sldIdLst>
+        </p14:section>
+        <p14:section name="Data" id="{9B601334-B9E5-8E4C-BC00-C489C19B66CC}">
+          <p14:sldIdLst>
             <p14:sldId id="260"/>
             <p14:sldId id="261"/>
-            <p14:sldId id="265"/>
+            <p14:sldId id="274"/>
+            <p14:sldId id="271"/>
+            <p14:sldId id="272"/>
+            <p14:sldId id="273"/>
+          </p14:sldIdLst>
+        </p14:section>
+        <p14:section name="Analysis of Data" id="{3F843067-739D-1B41-9BE2-BEC52FDF115E}">
+          <p14:sldIdLst>
+            <p14:sldId id="275"/>
+            <p14:sldId id="276"/>
           </p14:sldIdLst>
         </p14:section>
         <p14:section name="Some Results" id="{D22E8CED-CDA1-774F-AB2E-91553D97190D}">
           <p14:sldIdLst>
+            <p14:sldId id="265"/>
             <p14:sldId id="262"/>
             <p14:sldId id="263"/>
             <p14:sldId id="266"/>
@@ -294,7 +318,7 @@
           <a:p>
             <a:fld id="{D6B6AB59-4BF5-3945-BEF3-0E0018AC9BBC}" type="datetimeFigureOut">
               <a:rPr lang="en-US" smtClean="0"/>
-              <a:t>4/13/23</a:t>
+              <a:t>6/7/23</a:t>
             </a:fld>
             <a:endParaRPr lang="en-US"/>
           </a:p>
@@ -492,7 +516,7 @@
           <a:p>
             <a:fld id="{D6B6AB59-4BF5-3945-BEF3-0E0018AC9BBC}" type="datetimeFigureOut">
               <a:rPr lang="en-US" smtClean="0"/>
-              <a:t>4/13/23</a:t>
+              <a:t>6/7/23</a:t>
             </a:fld>
             <a:endParaRPr lang="en-US"/>
           </a:p>
@@ -700,7 +724,7 @@
           <a:p>
             <a:fld id="{D6B6AB59-4BF5-3945-BEF3-0E0018AC9BBC}" type="datetimeFigureOut">
               <a:rPr lang="en-US" smtClean="0"/>
-              <a:t>4/13/23</a:t>
+              <a:t>6/7/23</a:t>
             </a:fld>
             <a:endParaRPr lang="en-US"/>
           </a:p>
@@ -898,7 +922,7 @@
           <a:p>
             <a:fld id="{D6B6AB59-4BF5-3945-BEF3-0E0018AC9BBC}" type="datetimeFigureOut">
               <a:rPr lang="en-US" smtClean="0"/>
-              <a:t>4/13/23</a:t>
+              <a:t>6/7/23</a:t>
             </a:fld>
             <a:endParaRPr lang="en-US"/>
           </a:p>
@@ -1173,7 +1197,7 @@
           <a:p>
             <a:fld id="{D6B6AB59-4BF5-3945-BEF3-0E0018AC9BBC}" type="datetimeFigureOut">
               <a:rPr lang="en-US" smtClean="0"/>
-              <a:t>4/13/23</a:t>
+              <a:t>6/7/23</a:t>
             </a:fld>
             <a:endParaRPr lang="en-US"/>
           </a:p>
@@ -1438,7 +1462,7 @@
           <a:p>
             <a:fld id="{D6B6AB59-4BF5-3945-BEF3-0E0018AC9BBC}" type="datetimeFigureOut">
               <a:rPr lang="en-US" smtClean="0"/>
-              <a:t>4/13/23</a:t>
+              <a:t>6/7/23</a:t>
             </a:fld>
             <a:endParaRPr lang="en-US"/>
           </a:p>
@@ -1850,7 +1874,7 @@
           <a:p>
             <a:fld id="{D6B6AB59-4BF5-3945-BEF3-0E0018AC9BBC}" type="datetimeFigureOut">
               <a:rPr lang="en-US" smtClean="0"/>
-              <a:t>4/13/23</a:t>
+              <a:t>6/7/23</a:t>
             </a:fld>
             <a:endParaRPr lang="en-US"/>
           </a:p>
@@ -1991,7 +2015,7 @@
           <a:p>
             <a:fld id="{D6B6AB59-4BF5-3945-BEF3-0E0018AC9BBC}" type="datetimeFigureOut">
               <a:rPr lang="en-US" smtClean="0"/>
-              <a:t>4/13/23</a:t>
+              <a:t>6/7/23</a:t>
             </a:fld>
             <a:endParaRPr lang="en-US"/>
           </a:p>
@@ -2104,7 +2128,7 @@
           <a:p>
             <a:fld id="{D6B6AB59-4BF5-3945-BEF3-0E0018AC9BBC}" type="datetimeFigureOut">
               <a:rPr lang="en-US" smtClean="0"/>
-              <a:t>4/13/23</a:t>
+              <a:t>6/7/23</a:t>
             </a:fld>
             <a:endParaRPr lang="en-US"/>
           </a:p>
@@ -2415,7 +2439,7 @@
           <a:p>
             <a:fld id="{D6B6AB59-4BF5-3945-BEF3-0E0018AC9BBC}" type="datetimeFigureOut">
               <a:rPr lang="en-US" smtClean="0"/>
-              <a:t>4/13/23</a:t>
+              <a:t>6/7/23</a:t>
             </a:fld>
             <a:endParaRPr lang="en-US"/>
           </a:p>
@@ -2703,7 +2727,7 @@
           <a:p>
             <a:fld id="{D6B6AB59-4BF5-3945-BEF3-0E0018AC9BBC}" type="datetimeFigureOut">
               <a:rPr lang="en-US" smtClean="0"/>
-              <a:t>4/13/23</a:t>
+              <a:t>6/7/23</a:t>
             </a:fld>
             <a:endParaRPr lang="en-US"/>
           </a:p>
@@ -2944,7 +2968,7 @@
           <a:p>
             <a:fld id="{D6B6AB59-4BF5-3945-BEF3-0E0018AC9BBC}" type="datetimeFigureOut">
               <a:rPr lang="en-US" smtClean="0"/>
-              <a:t>4/13/23</a:t>
+              <a:t>6/7/23</a:t>
             </a:fld>
             <a:endParaRPr lang="en-US"/>
           </a:p>
@@ -3389,7 +3413,7 @@
           <a:p>
             <a:r>
               <a:rPr lang="en-US" dirty="0"/>
-              <a:t>Modeling the State Transition</a:t>
+              <a:t>Modeling State Transition</a:t>
             </a:r>
             <a:br>
               <a:rPr lang="en-US" dirty="0"/>
@@ -3436,6 +3460,975 @@
           <p:cNvPr id="2" name="Title 1">
             <a:extLst>
               <a:ext uri="{FF2B5EF4-FFF2-40B4-BE49-F238E27FC236}">
+                <a16:creationId xmlns:a16="http://schemas.microsoft.com/office/drawing/2014/main" id="{7AAA17AC-4156-7733-BAD3-AAF4D21F09BB}"/>
+              </a:ext>
+            </a:extLst>
+          </p:cNvPr>
+          <p:cNvSpPr>
+            <a:spLocks noGrp="1"/>
+          </p:cNvSpPr>
+          <p:nvPr>
+            <p:ph type="title"/>
+          </p:nvPr>
+        </p:nvSpPr>
+        <p:spPr>
+          <a:xfrm>
+            <a:off x="957943" y="142874"/>
+            <a:ext cx="10515600" cy="1325563"/>
+          </a:xfrm>
+        </p:spPr>
+        <p:txBody>
+          <a:bodyPr/>
+          <a:lstStyle/>
+          <a:p>
+            <a:r>
+              <a:rPr lang="en-US" dirty="0"/>
+              <a:t>Relationship between load and frequency</a:t>
+            </a:r>
+          </a:p>
+        </p:txBody>
+      </p:sp>
+      <p:pic>
+        <p:nvPicPr>
+          <p:cNvPr id="1026" name="Picture 2">
+            <a:extLst>
+              <a:ext uri="{FF2B5EF4-FFF2-40B4-BE49-F238E27FC236}">
+                <a16:creationId xmlns:a16="http://schemas.microsoft.com/office/drawing/2014/main" id="{09C724A7-508F-2D4B-B915-A387A1C25AB3}"/>
+              </a:ext>
+            </a:extLst>
+          </p:cNvPr>
+          <p:cNvPicPr>
+            <a:picLocks noGrp="1" noChangeAspect="1" noChangeArrowheads="1"/>
+          </p:cNvPicPr>
+          <p:nvPr>
+            <p:ph idx="1"/>
+          </p:nvPr>
+        </p:nvPicPr>
+        <p:blipFill>
+          <a:blip r:embed="rId2">
+            <a:extLst>
+              <a:ext uri="{28A0092B-C50C-407E-A947-70E740481C1C}">
+                <a14:useLocalDpi xmlns:a14="http://schemas.microsoft.com/office/drawing/2010/main" val="0"/>
+              </a:ext>
+            </a:extLst>
+          </a:blip>
+          <a:srcRect/>
+          <a:stretch>
+            <a:fillRect/>
+          </a:stretch>
+        </p:blipFill>
+        <p:spPr bwMode="auto">
+          <a:xfrm>
+            <a:off x="1764393" y="1623672"/>
+            <a:ext cx="8902700" cy="4102100"/>
+          </a:xfrm>
+          <a:prstGeom prst="rect">
+            <a:avLst/>
+          </a:prstGeom>
+          <a:noFill/>
+          <a:extLst>
+            <a:ext uri="{909E8E84-426E-40DD-AFC4-6F175D3DCCD1}">
+              <a14:hiddenFill xmlns:a14="http://schemas.microsoft.com/office/drawing/2010/main">
+                <a:solidFill>
+                  <a:srgbClr val="FFFFFF"/>
+                </a:solidFill>
+              </a14:hiddenFill>
+            </a:ext>
+          </a:extLst>
+        </p:spPr>
+      </p:pic>
+      <p:sp>
+        <p:nvSpPr>
+          <p:cNvPr id="4" name="TextBox 3">
+            <a:extLst>
+              <a:ext uri="{FF2B5EF4-FFF2-40B4-BE49-F238E27FC236}">
+                <a16:creationId xmlns:a16="http://schemas.microsoft.com/office/drawing/2014/main" id="{B1D712AA-9B26-314E-D9CB-06D871E9262C}"/>
+              </a:ext>
+            </a:extLst>
+          </p:cNvPr>
+          <p:cNvSpPr txBox="1"/>
+          <p:nvPr/>
+        </p:nvSpPr>
+        <p:spPr>
+          <a:xfrm>
+            <a:off x="4519411" y="5881007"/>
+            <a:ext cx="5550795" cy="369332"/>
+          </a:xfrm>
+          <a:prstGeom prst="rect">
+            <a:avLst/>
+          </a:prstGeom>
+          <a:noFill/>
+        </p:spPr>
+        <p:txBody>
+          <a:bodyPr wrap="square" rtlCol="0">
+            <a:spAutoFit/>
+          </a:bodyPr>
+          <a:lstStyle/>
+          <a:p>
+            <a:r>
+              <a:rPr lang="en-US" dirty="0"/>
+              <a:t>cpuF : blue , cpuScore : green</a:t>
+            </a:r>
+          </a:p>
+        </p:txBody>
+      </p:sp>
+    </p:spTree>
+    <p:extLst>
+      <p:ext uri="{BB962C8B-B14F-4D97-AF65-F5344CB8AC3E}">
+        <p14:creationId xmlns:p14="http://schemas.microsoft.com/office/powerpoint/2010/main" val="62803630"/>
+      </p:ext>
+    </p:extLst>
+  </p:cSld>
+  <p:clrMapOvr>
+    <a:masterClrMapping/>
+  </p:clrMapOvr>
+</p:sld>
+</file>
+
+<file path=ppt/slides/slide11.xml><?xml version="1.0" encoding="utf-8"?>
+<p:sld xmlns:a="http://schemas.openxmlformats.org/drawingml/2006/main" xmlns:r="http://schemas.openxmlformats.org/officeDocument/2006/relationships" xmlns:p="http://schemas.openxmlformats.org/presentationml/2006/main">
+  <p:cSld>
+    <p:spTree>
+      <p:nvGrpSpPr>
+        <p:cNvPr id="1" name=""/>
+        <p:cNvGrpSpPr/>
+        <p:nvPr/>
+      </p:nvGrpSpPr>
+      <p:grpSpPr>
+        <a:xfrm>
+          <a:off x="0" y="0"/>
+          <a:ext cx="0" cy="0"/>
+          <a:chOff x="0" y="0"/>
+          <a:chExt cx="0" cy="0"/>
+        </a:xfrm>
+      </p:grpSpPr>
+      <p:sp>
+        <p:nvSpPr>
+          <p:cNvPr id="2" name="Title 1">
+            <a:extLst>
+              <a:ext uri="{FF2B5EF4-FFF2-40B4-BE49-F238E27FC236}">
+                <a16:creationId xmlns:a16="http://schemas.microsoft.com/office/drawing/2014/main" id="{C31C536D-8A5B-6649-A7BE-97863BAF6B6D}"/>
+              </a:ext>
+            </a:extLst>
+          </p:cNvPr>
+          <p:cNvSpPr>
+            <a:spLocks noGrp="1"/>
+          </p:cNvSpPr>
+          <p:nvPr>
+            <p:ph type="title"/>
+          </p:nvPr>
+        </p:nvSpPr>
+        <p:spPr/>
+        <p:txBody>
+          <a:bodyPr/>
+          <a:lstStyle/>
+          <a:p>
+            <a:r>
+              <a:rPr lang="en-US" dirty="0"/>
+              <a:t>Relationship between load and frequency</a:t>
+            </a:r>
+          </a:p>
+        </p:txBody>
+      </p:sp>
+      <p:pic>
+        <p:nvPicPr>
+          <p:cNvPr id="2050" name="Picture 2">
+            <a:extLst>
+              <a:ext uri="{FF2B5EF4-FFF2-40B4-BE49-F238E27FC236}">
+                <a16:creationId xmlns:a16="http://schemas.microsoft.com/office/drawing/2014/main" id="{C90CB381-98EA-41C3-788F-66D342EF6EF5}"/>
+              </a:ext>
+            </a:extLst>
+          </p:cNvPr>
+          <p:cNvPicPr>
+            <a:picLocks noGrp="1" noChangeAspect="1" noChangeArrowheads="1"/>
+          </p:cNvPicPr>
+          <p:nvPr>
+            <p:ph idx="1"/>
+          </p:nvPr>
+        </p:nvPicPr>
+        <p:blipFill>
+          <a:blip r:embed="rId2">
+            <a:extLst>
+              <a:ext uri="{28A0092B-C50C-407E-A947-70E740481C1C}">
+                <a14:useLocalDpi xmlns:a14="http://schemas.microsoft.com/office/drawing/2010/main" val="0"/>
+              </a:ext>
+            </a:extLst>
+          </a:blip>
+          <a:srcRect/>
+          <a:stretch>
+            <a:fillRect/>
+          </a:stretch>
+        </p:blipFill>
+        <p:spPr bwMode="auto">
+          <a:xfrm>
+            <a:off x="1331686" y="1525702"/>
+            <a:ext cx="8788400" cy="4102100"/>
+          </a:xfrm>
+          <a:prstGeom prst="rect">
+            <a:avLst/>
+          </a:prstGeom>
+          <a:noFill/>
+          <a:extLst>
+            <a:ext uri="{909E8E84-426E-40DD-AFC4-6F175D3DCCD1}">
+              <a14:hiddenFill xmlns:a14="http://schemas.microsoft.com/office/drawing/2010/main">
+                <a:solidFill>
+                  <a:srgbClr val="FFFFFF"/>
+                </a:solidFill>
+              </a14:hiddenFill>
+            </a:ext>
+          </a:extLst>
+        </p:spPr>
+      </p:pic>
+      <p:sp>
+        <p:nvSpPr>
+          <p:cNvPr id="4" name="TextBox 3">
+            <a:extLst>
+              <a:ext uri="{FF2B5EF4-FFF2-40B4-BE49-F238E27FC236}">
+                <a16:creationId xmlns:a16="http://schemas.microsoft.com/office/drawing/2014/main" id="{3A935981-EC59-8C47-A498-2C44AC9DD03A}"/>
+              </a:ext>
+            </a:extLst>
+          </p:cNvPr>
+          <p:cNvSpPr txBox="1"/>
+          <p:nvPr/>
+        </p:nvSpPr>
+        <p:spPr>
+          <a:xfrm>
+            <a:off x="4519411" y="5881007"/>
+            <a:ext cx="5550795" cy="369332"/>
+          </a:xfrm>
+          <a:prstGeom prst="rect">
+            <a:avLst/>
+          </a:prstGeom>
+          <a:noFill/>
+        </p:spPr>
+        <p:txBody>
+          <a:bodyPr wrap="square" rtlCol="0">
+            <a:spAutoFit/>
+          </a:bodyPr>
+          <a:lstStyle/>
+          <a:p>
+            <a:r>
+              <a:rPr lang="en-US" dirty="0" err="1"/>
+              <a:t>memF</a:t>
+            </a:r>
+            <a:r>
+              <a:rPr lang="en-US" dirty="0"/>
+              <a:t> : blue , </a:t>
+            </a:r>
+            <a:r>
+              <a:rPr lang="en-US" dirty="0" err="1"/>
+              <a:t>memScore</a:t>
+            </a:r>
+            <a:r>
+              <a:rPr lang="en-US" dirty="0"/>
+              <a:t> : green</a:t>
+            </a:r>
+          </a:p>
+        </p:txBody>
+      </p:sp>
+    </p:spTree>
+    <p:extLst>
+      <p:ext uri="{BB962C8B-B14F-4D97-AF65-F5344CB8AC3E}">
+        <p14:creationId xmlns:p14="http://schemas.microsoft.com/office/powerpoint/2010/main" val="859755574"/>
+      </p:ext>
+    </p:extLst>
+  </p:cSld>
+  <p:clrMapOvr>
+    <a:masterClrMapping/>
+  </p:clrMapOvr>
+</p:sld>
+</file>
+
+<file path=ppt/slides/slide12.xml><?xml version="1.0" encoding="utf-8"?>
+<p:sld xmlns:a="http://schemas.openxmlformats.org/drawingml/2006/main" xmlns:r="http://schemas.openxmlformats.org/officeDocument/2006/relationships" xmlns:p="http://schemas.openxmlformats.org/presentationml/2006/main">
+  <p:cSld>
+    <p:spTree>
+      <p:nvGrpSpPr>
+        <p:cNvPr id="1" name=""/>
+        <p:cNvGrpSpPr/>
+        <p:nvPr/>
+      </p:nvGrpSpPr>
+      <p:grpSpPr>
+        <a:xfrm>
+          <a:off x="0" y="0"/>
+          <a:ext cx="0" cy="0"/>
+          <a:chOff x="0" y="0"/>
+          <a:chExt cx="0" cy="0"/>
+        </a:xfrm>
+      </p:grpSpPr>
+      <p:sp>
+        <p:nvSpPr>
+          <p:cNvPr id="2" name="Title 1">
+            <a:extLst>
+              <a:ext uri="{FF2B5EF4-FFF2-40B4-BE49-F238E27FC236}">
+                <a16:creationId xmlns:a16="http://schemas.microsoft.com/office/drawing/2014/main" id="{05CE97B5-0A98-D5C9-A496-882681288499}"/>
+              </a:ext>
+            </a:extLst>
+          </p:cNvPr>
+          <p:cNvSpPr>
+            <a:spLocks noGrp="1"/>
+          </p:cNvSpPr>
+          <p:nvPr>
+            <p:ph type="title"/>
+          </p:nvPr>
+        </p:nvSpPr>
+        <p:spPr/>
+        <p:txBody>
+          <a:bodyPr/>
+          <a:lstStyle/>
+          <a:p>
+            <a:r>
+              <a:rPr lang="en-US" dirty="0"/>
+              <a:t>Relationship between CPU and memory</a:t>
+            </a:r>
+          </a:p>
+        </p:txBody>
+      </p:sp>
+      <p:pic>
+        <p:nvPicPr>
+          <p:cNvPr id="3074" name="Picture 2">
+            <a:extLst>
+              <a:ext uri="{FF2B5EF4-FFF2-40B4-BE49-F238E27FC236}">
+                <a16:creationId xmlns:a16="http://schemas.microsoft.com/office/drawing/2014/main" id="{7CC5FA03-F201-CF2D-C2B7-4A78D812AB6D}"/>
+              </a:ext>
+            </a:extLst>
+          </p:cNvPr>
+          <p:cNvPicPr>
+            <a:picLocks noGrp="1" noChangeAspect="1" noChangeArrowheads="1"/>
+          </p:cNvPicPr>
+          <p:nvPr>
+            <p:ph idx="1"/>
+          </p:nvPr>
+        </p:nvPicPr>
+        <p:blipFill>
+          <a:blip r:embed="rId2">
+            <a:extLst>
+              <a:ext uri="{28A0092B-C50C-407E-A947-70E740481C1C}">
+                <a14:useLocalDpi xmlns:a14="http://schemas.microsoft.com/office/drawing/2010/main" val="0"/>
+              </a:ext>
+            </a:extLst>
+          </a:blip>
+          <a:srcRect/>
+          <a:stretch>
+            <a:fillRect/>
+          </a:stretch>
+        </p:blipFill>
+        <p:spPr bwMode="auto">
+          <a:xfrm>
+            <a:off x="1644650" y="1950244"/>
+            <a:ext cx="8902700" cy="4102100"/>
+          </a:xfrm>
+          <a:prstGeom prst="rect">
+            <a:avLst/>
+          </a:prstGeom>
+          <a:noFill/>
+          <a:extLst>
+            <a:ext uri="{909E8E84-426E-40DD-AFC4-6F175D3DCCD1}">
+              <a14:hiddenFill xmlns:a14="http://schemas.microsoft.com/office/drawing/2010/main">
+                <a:solidFill>
+                  <a:srgbClr val="FFFFFF"/>
+                </a:solidFill>
+              </a14:hiddenFill>
+            </a:ext>
+          </a:extLst>
+        </p:spPr>
+      </p:pic>
+    </p:spTree>
+    <p:extLst>
+      <p:ext uri="{BB962C8B-B14F-4D97-AF65-F5344CB8AC3E}">
+        <p14:creationId xmlns:p14="http://schemas.microsoft.com/office/powerpoint/2010/main" val="2519644194"/>
+      </p:ext>
+    </p:extLst>
+  </p:cSld>
+  <p:clrMapOvr>
+    <a:masterClrMapping/>
+  </p:clrMapOvr>
+</p:sld>
+</file>
+
+<file path=ppt/slides/slide13.xml><?xml version="1.0" encoding="utf-8"?>
+<p:sld xmlns:a="http://schemas.openxmlformats.org/drawingml/2006/main" xmlns:r="http://schemas.openxmlformats.org/officeDocument/2006/relationships" xmlns:p="http://schemas.openxmlformats.org/presentationml/2006/main">
+  <p:cSld>
+    <p:spTree>
+      <p:nvGrpSpPr>
+        <p:cNvPr id="1" name=""/>
+        <p:cNvGrpSpPr/>
+        <p:nvPr/>
+      </p:nvGrpSpPr>
+      <p:grpSpPr>
+        <a:xfrm>
+          <a:off x="0" y="0"/>
+          <a:ext cx="0" cy="0"/>
+          <a:chOff x="0" y="0"/>
+          <a:chExt cx="0" cy="0"/>
+        </a:xfrm>
+      </p:grpSpPr>
+      <p:sp>
+        <p:nvSpPr>
+          <p:cNvPr id="2" name="Title 1">
+            <a:extLst>
+              <a:ext uri="{FF2B5EF4-FFF2-40B4-BE49-F238E27FC236}">
+                <a16:creationId xmlns:a16="http://schemas.microsoft.com/office/drawing/2014/main" id="{C4AC139C-E069-2436-7643-D9819E93DBB0}"/>
+              </a:ext>
+            </a:extLst>
+          </p:cNvPr>
+          <p:cNvSpPr>
+            <a:spLocks noGrp="1"/>
+          </p:cNvSpPr>
+          <p:nvPr>
+            <p:ph type="title"/>
+          </p:nvPr>
+        </p:nvSpPr>
+        <p:spPr/>
+        <p:txBody>
+          <a:bodyPr/>
+          <a:lstStyle/>
+          <a:p>
+            <a:r>
+              <a:rPr lang="en-US" dirty="0"/>
+              <a:t>Autocorrelation of Frequency: CPU</a:t>
+            </a:r>
+          </a:p>
+        </p:txBody>
+      </p:sp>
+      <p:pic>
+        <p:nvPicPr>
+          <p:cNvPr id="5122" name="Picture 2">
+            <a:extLst>
+              <a:ext uri="{FF2B5EF4-FFF2-40B4-BE49-F238E27FC236}">
+                <a16:creationId xmlns:a16="http://schemas.microsoft.com/office/drawing/2014/main" id="{D067369C-645F-4F96-4AD5-AB573F8F2D42}"/>
+              </a:ext>
+            </a:extLst>
+          </p:cNvPr>
+          <p:cNvPicPr>
+            <a:picLocks noGrp="1" noChangeAspect="1" noChangeArrowheads="1"/>
+          </p:cNvPicPr>
+          <p:nvPr>
+            <p:ph idx="1"/>
+          </p:nvPr>
+        </p:nvPicPr>
+        <p:blipFill>
+          <a:blip r:embed="rId2">
+            <a:extLst>
+              <a:ext uri="{28A0092B-C50C-407E-A947-70E740481C1C}">
+                <a14:useLocalDpi xmlns:a14="http://schemas.microsoft.com/office/drawing/2010/main" val="0"/>
+              </a:ext>
+            </a:extLst>
+          </a:blip>
+          <a:srcRect/>
+          <a:stretch>
+            <a:fillRect/>
+          </a:stretch>
+        </p:blipFill>
+        <p:spPr bwMode="auto">
+          <a:xfrm>
+            <a:off x="1750987" y="1825625"/>
+            <a:ext cx="8690026" cy="4351338"/>
+          </a:xfrm>
+          <a:prstGeom prst="rect">
+            <a:avLst/>
+          </a:prstGeom>
+          <a:noFill/>
+          <a:extLst>
+            <a:ext uri="{909E8E84-426E-40DD-AFC4-6F175D3DCCD1}">
+              <a14:hiddenFill xmlns:a14="http://schemas.microsoft.com/office/drawing/2010/main">
+                <a:solidFill>
+                  <a:srgbClr val="FFFFFF"/>
+                </a:solidFill>
+              </a14:hiddenFill>
+            </a:ext>
+          </a:extLst>
+        </p:spPr>
+      </p:pic>
+    </p:spTree>
+    <p:extLst>
+      <p:ext uri="{BB962C8B-B14F-4D97-AF65-F5344CB8AC3E}">
+        <p14:creationId xmlns:p14="http://schemas.microsoft.com/office/powerpoint/2010/main" val="1421295361"/>
+      </p:ext>
+    </p:extLst>
+  </p:cSld>
+  <p:clrMapOvr>
+    <a:masterClrMapping/>
+  </p:clrMapOvr>
+</p:sld>
+</file>
+
+<file path=ppt/slides/slide14.xml><?xml version="1.0" encoding="utf-8"?>
+<p:sld xmlns:a="http://schemas.openxmlformats.org/drawingml/2006/main" xmlns:r="http://schemas.openxmlformats.org/officeDocument/2006/relationships" xmlns:p="http://schemas.openxmlformats.org/presentationml/2006/main">
+  <p:cSld>
+    <p:spTree>
+      <p:nvGrpSpPr>
+        <p:cNvPr id="1" name=""/>
+        <p:cNvGrpSpPr/>
+        <p:nvPr/>
+      </p:nvGrpSpPr>
+      <p:grpSpPr>
+        <a:xfrm>
+          <a:off x="0" y="0"/>
+          <a:ext cx="0" cy="0"/>
+          <a:chOff x="0" y="0"/>
+          <a:chExt cx="0" cy="0"/>
+        </a:xfrm>
+      </p:grpSpPr>
+      <p:sp>
+        <p:nvSpPr>
+          <p:cNvPr id="2" name="Title 1">
+            <a:extLst>
+              <a:ext uri="{FF2B5EF4-FFF2-40B4-BE49-F238E27FC236}">
+                <a16:creationId xmlns:a16="http://schemas.microsoft.com/office/drawing/2014/main" id="{BF241963-C8FD-835C-8FDD-7AAC71B77BAC}"/>
+              </a:ext>
+            </a:extLst>
+          </p:cNvPr>
+          <p:cNvSpPr>
+            <a:spLocks noGrp="1"/>
+          </p:cNvSpPr>
+          <p:nvPr>
+            <p:ph type="title"/>
+          </p:nvPr>
+        </p:nvSpPr>
+        <p:spPr/>
+        <p:txBody>
+          <a:bodyPr/>
+          <a:lstStyle/>
+          <a:p>
+            <a:r>
+              <a:rPr lang="en-US" dirty="0"/>
+              <a:t>Autocorrelation of Frequency Mem</a:t>
+            </a:r>
+          </a:p>
+        </p:txBody>
+      </p:sp>
+      <p:pic>
+        <p:nvPicPr>
+          <p:cNvPr id="6146" name="Picture 2">
+            <a:extLst>
+              <a:ext uri="{FF2B5EF4-FFF2-40B4-BE49-F238E27FC236}">
+                <a16:creationId xmlns:a16="http://schemas.microsoft.com/office/drawing/2014/main" id="{F9EB67D9-A2F8-A5FE-22F8-470C256805D5}"/>
+              </a:ext>
+            </a:extLst>
+          </p:cNvPr>
+          <p:cNvPicPr>
+            <a:picLocks noGrp="1" noChangeAspect="1" noChangeArrowheads="1"/>
+          </p:cNvPicPr>
+          <p:nvPr>
+            <p:ph idx="1"/>
+          </p:nvPr>
+        </p:nvPicPr>
+        <p:blipFill>
+          <a:blip r:embed="rId2">
+            <a:extLst>
+              <a:ext uri="{28A0092B-C50C-407E-A947-70E740481C1C}">
+                <a14:useLocalDpi xmlns:a14="http://schemas.microsoft.com/office/drawing/2010/main" val="0"/>
+              </a:ext>
+            </a:extLst>
+          </a:blip>
+          <a:srcRect/>
+          <a:stretch>
+            <a:fillRect/>
+          </a:stretch>
+        </p:blipFill>
+        <p:spPr bwMode="auto">
+          <a:xfrm>
+            <a:off x="1750987" y="1825625"/>
+            <a:ext cx="8690026" cy="4351338"/>
+          </a:xfrm>
+          <a:prstGeom prst="rect">
+            <a:avLst/>
+          </a:prstGeom>
+          <a:noFill/>
+          <a:extLst>
+            <a:ext uri="{909E8E84-426E-40DD-AFC4-6F175D3DCCD1}">
+              <a14:hiddenFill xmlns:a14="http://schemas.microsoft.com/office/drawing/2010/main">
+                <a:solidFill>
+                  <a:srgbClr val="FFFFFF"/>
+                </a:solidFill>
+              </a14:hiddenFill>
+            </a:ext>
+          </a:extLst>
+        </p:spPr>
+      </p:pic>
+    </p:spTree>
+    <p:extLst>
+      <p:ext uri="{BB962C8B-B14F-4D97-AF65-F5344CB8AC3E}">
+        <p14:creationId xmlns:p14="http://schemas.microsoft.com/office/powerpoint/2010/main" val="1642769730"/>
+      </p:ext>
+    </p:extLst>
+  </p:cSld>
+  <p:clrMapOvr>
+    <a:masterClrMapping/>
+  </p:clrMapOvr>
+</p:sld>
+</file>
+
+<file path=ppt/slides/slide15.xml><?xml version="1.0" encoding="utf-8"?>
+<p:sld xmlns:a="http://schemas.openxmlformats.org/drawingml/2006/main" xmlns:r="http://schemas.openxmlformats.org/officeDocument/2006/relationships" xmlns:p="http://schemas.openxmlformats.org/presentationml/2006/main">
+  <p:cSld>
+    <p:spTree>
+      <p:nvGrpSpPr>
+        <p:cNvPr id="1" name=""/>
+        <p:cNvGrpSpPr/>
+        <p:nvPr/>
+      </p:nvGrpSpPr>
+      <p:grpSpPr>
+        <a:xfrm>
+          <a:off x="0" y="0"/>
+          <a:ext cx="0" cy="0"/>
+          <a:chOff x="0" y="0"/>
+          <a:chExt cx="0" cy="0"/>
+        </a:xfrm>
+      </p:grpSpPr>
+      <p:sp>
+        <p:nvSpPr>
+          <p:cNvPr id="2" name="Title 1">
+            <a:extLst>
+              <a:ext uri="{FF2B5EF4-FFF2-40B4-BE49-F238E27FC236}">
+                <a16:creationId xmlns:a16="http://schemas.microsoft.com/office/drawing/2014/main" id="{AF51662E-BB24-39FA-80DD-CD9E87045A83}"/>
+              </a:ext>
+            </a:extLst>
+          </p:cNvPr>
+          <p:cNvSpPr>
+            <a:spLocks noGrp="1"/>
+          </p:cNvSpPr>
+          <p:nvPr>
+            <p:ph type="title"/>
+          </p:nvPr>
+        </p:nvSpPr>
+        <p:spPr/>
+        <p:txBody>
+          <a:bodyPr/>
+          <a:lstStyle/>
+          <a:p>
+            <a:r>
+              <a:rPr lang="en-US" dirty="0"/>
+              <a:t>How are we modeling</a:t>
+            </a:r>
+          </a:p>
+        </p:txBody>
+      </p:sp>
+      <p:sp>
+        <p:nvSpPr>
+          <p:cNvPr id="3" name="Content Placeholder 2">
+            <a:extLst>
+              <a:ext uri="{FF2B5EF4-FFF2-40B4-BE49-F238E27FC236}">
+                <a16:creationId xmlns:a16="http://schemas.microsoft.com/office/drawing/2014/main" id="{9DAAC8C5-1096-C209-3D6A-2DB2B985B468}"/>
+              </a:ext>
+            </a:extLst>
+          </p:cNvPr>
+          <p:cNvSpPr>
+            <a:spLocks noGrp="1"/>
+          </p:cNvSpPr>
+          <p:nvPr>
+            <p:ph idx="1"/>
+          </p:nvPr>
+        </p:nvSpPr>
+        <p:spPr/>
+        <p:txBody>
+          <a:bodyPr/>
+          <a:lstStyle/>
+          <a:p>
+            <a:r>
+              <a:rPr lang="en-US" dirty="0"/>
+              <a:t>We are going to estimate various auto-correlation lags and moving average parameters to check if we get good model</a:t>
+            </a:r>
+          </a:p>
+          <a:p>
+            <a:endParaRPr lang="en-US" dirty="0"/>
+          </a:p>
+          <a:p>
+            <a:endParaRPr lang="en-US" dirty="0"/>
+          </a:p>
+          <a:p>
+            <a:r>
+              <a:rPr lang="en-US" dirty="0"/>
+              <a:t>Order = (</a:t>
+            </a:r>
+            <a:r>
+              <a:rPr lang="en-US" dirty="0" err="1"/>
+              <a:t>p,d,q</a:t>
+            </a:r>
+            <a:r>
+              <a:rPr lang="en-US" dirty="0"/>
+              <a:t>) </a:t>
+            </a:r>
+            <a:r>
+              <a:rPr lang="en-US" dirty="0">
+                <a:sym typeface="Wingdings" pitchFamily="2" charset="2"/>
+              </a:rPr>
+              <a:t> where p : auto-correlation lag, q = moving average of errors, d = order of differentiation for the data to be stationary over time</a:t>
+            </a:r>
+            <a:endParaRPr lang="en-US" dirty="0"/>
+          </a:p>
+        </p:txBody>
+      </p:sp>
+      <p:pic>
+        <p:nvPicPr>
+          <p:cNvPr id="4" name="Content Placeholder 6">
+            <a:extLst>
+              <a:ext uri="{FF2B5EF4-FFF2-40B4-BE49-F238E27FC236}">
+                <a16:creationId xmlns:a16="http://schemas.microsoft.com/office/drawing/2014/main" id="{E2E657DC-F0E7-C9C4-222D-4CA8FC94A174}"/>
+              </a:ext>
+            </a:extLst>
+          </p:cNvPr>
+          <p:cNvPicPr>
+            <a:picLocks noChangeAspect="1"/>
+          </p:cNvPicPr>
+          <p:nvPr/>
+        </p:nvPicPr>
+        <p:blipFill>
+          <a:blip r:embed="rId2"/>
+          <a:stretch>
+            <a:fillRect/>
+          </a:stretch>
+        </p:blipFill>
+        <p:spPr>
+          <a:xfrm>
+            <a:off x="1161473" y="2811535"/>
+            <a:ext cx="8623300" cy="495300"/>
+          </a:xfrm>
+          <a:prstGeom prst="rect">
+            <a:avLst/>
+          </a:prstGeom>
+        </p:spPr>
+      </p:pic>
+    </p:spTree>
+    <p:extLst>
+      <p:ext uri="{BB962C8B-B14F-4D97-AF65-F5344CB8AC3E}">
+        <p14:creationId xmlns:p14="http://schemas.microsoft.com/office/powerpoint/2010/main" val="1887907696"/>
+      </p:ext>
+    </p:extLst>
+  </p:cSld>
+  <p:clrMapOvr>
+    <a:masterClrMapping/>
+  </p:clrMapOvr>
+</p:sld>
+</file>
+
+<file path=ppt/slides/slide16.xml><?xml version="1.0" encoding="utf-8"?>
+<p:sld xmlns:a="http://schemas.openxmlformats.org/drawingml/2006/main" xmlns:r="http://schemas.openxmlformats.org/officeDocument/2006/relationships" xmlns:p="http://schemas.openxmlformats.org/presentationml/2006/main">
+  <p:cSld>
+    <p:spTree>
+      <p:nvGrpSpPr>
+        <p:cNvPr id="1" name=""/>
+        <p:cNvGrpSpPr/>
+        <p:nvPr/>
+      </p:nvGrpSpPr>
+      <p:grpSpPr>
+        <a:xfrm>
+          <a:off x="0" y="0"/>
+          <a:ext cx="0" cy="0"/>
+          <a:chOff x="0" y="0"/>
+          <a:chExt cx="0" cy="0"/>
+        </a:xfrm>
+      </p:grpSpPr>
+      <p:sp>
+        <p:nvSpPr>
+          <p:cNvPr id="2" name="Title 1">
+            <a:extLst>
+              <a:ext uri="{FF2B5EF4-FFF2-40B4-BE49-F238E27FC236}">
+                <a16:creationId xmlns:a16="http://schemas.microsoft.com/office/drawing/2014/main" id="{873786AC-7029-A72B-F3D0-C7968D287445}"/>
+              </a:ext>
+            </a:extLst>
+          </p:cNvPr>
+          <p:cNvSpPr>
+            <a:spLocks noGrp="1"/>
+          </p:cNvSpPr>
+          <p:nvPr>
+            <p:ph type="title"/>
+          </p:nvPr>
+        </p:nvSpPr>
+        <p:spPr/>
+        <p:txBody>
+          <a:bodyPr/>
+          <a:lstStyle/>
+          <a:p>
+            <a:pPr algn="ctr"/>
+            <a:r>
+              <a:rPr lang="en-US" dirty="0"/>
+              <a:t>Some introductory result</a:t>
+            </a:r>
+          </a:p>
+        </p:txBody>
+      </p:sp>
+      <p:sp>
+        <p:nvSpPr>
+          <p:cNvPr id="3" name="Content Placeholder 2">
+            <a:extLst>
+              <a:ext uri="{FF2B5EF4-FFF2-40B4-BE49-F238E27FC236}">
+                <a16:creationId xmlns:a16="http://schemas.microsoft.com/office/drawing/2014/main" id="{76101D1C-C407-1FC5-F504-93BB9AF4110B}"/>
+              </a:ext>
+            </a:extLst>
+          </p:cNvPr>
+          <p:cNvSpPr>
+            <a:spLocks noGrp="1"/>
+          </p:cNvSpPr>
+          <p:nvPr>
+            <p:ph idx="1"/>
+          </p:nvPr>
+        </p:nvSpPr>
+        <p:spPr/>
+        <p:txBody>
+          <a:bodyPr/>
+          <a:lstStyle/>
+          <a:p>
+            <a:endParaRPr lang="en-US" dirty="0"/>
+          </a:p>
+          <a:p>
+            <a:endParaRPr lang="en-US" dirty="0"/>
+          </a:p>
+        </p:txBody>
+      </p:sp>
+      <p:pic>
+        <p:nvPicPr>
+          <p:cNvPr id="5" name="Picture 4" descr="A screenshot of a computer&#10;&#10;Description automatically generated with low confidence">
+            <a:extLst>
+              <a:ext uri="{FF2B5EF4-FFF2-40B4-BE49-F238E27FC236}">
+                <a16:creationId xmlns:a16="http://schemas.microsoft.com/office/drawing/2014/main" id="{DEF96C1C-F728-C16B-7671-7A6589F65143}"/>
+              </a:ext>
+            </a:extLst>
+          </p:cNvPr>
+          <p:cNvPicPr>
+            <a:picLocks noChangeAspect="1"/>
+          </p:cNvPicPr>
+          <p:nvPr/>
+        </p:nvPicPr>
+        <p:blipFill>
+          <a:blip r:embed="rId2"/>
+          <a:stretch>
+            <a:fillRect/>
+          </a:stretch>
+        </p:blipFill>
+        <p:spPr>
+          <a:xfrm>
+            <a:off x="2409264" y="2120275"/>
+            <a:ext cx="7772400" cy="4262876"/>
+          </a:xfrm>
+          <a:prstGeom prst="rect">
+            <a:avLst/>
+          </a:prstGeom>
+        </p:spPr>
+      </p:pic>
+    </p:spTree>
+    <p:extLst>
+      <p:ext uri="{BB962C8B-B14F-4D97-AF65-F5344CB8AC3E}">
+        <p14:creationId xmlns:p14="http://schemas.microsoft.com/office/powerpoint/2010/main" val="2692328184"/>
+      </p:ext>
+    </p:extLst>
+  </p:cSld>
+  <p:clrMapOvr>
+    <a:masterClrMapping/>
+  </p:clrMapOvr>
+</p:sld>
+</file>
+
+<file path=ppt/slides/slide17.xml><?xml version="1.0" encoding="utf-8"?>
+<p:sld xmlns:a="http://schemas.openxmlformats.org/drawingml/2006/main" xmlns:r="http://schemas.openxmlformats.org/officeDocument/2006/relationships" xmlns:p="http://schemas.openxmlformats.org/presentationml/2006/main">
+  <p:cSld>
+    <p:spTree>
+      <p:nvGrpSpPr>
+        <p:cNvPr id="1" name=""/>
+        <p:cNvGrpSpPr/>
+        <p:nvPr/>
+      </p:nvGrpSpPr>
+      <p:grpSpPr>
+        <a:xfrm>
+          <a:off x="0" y="0"/>
+          <a:ext cx="0" cy="0"/>
+          <a:chOff x="0" y="0"/>
+          <a:chExt cx="0" cy="0"/>
+        </a:xfrm>
+      </p:grpSpPr>
+      <p:sp>
+        <p:nvSpPr>
+          <p:cNvPr id="2" name="Title 1">
+            <a:extLst>
+              <a:ext uri="{FF2B5EF4-FFF2-40B4-BE49-F238E27FC236}">
+                <a16:creationId xmlns:a16="http://schemas.microsoft.com/office/drawing/2014/main" id="{1B090EEE-3A3D-A038-4857-31BDA990461D}"/>
+              </a:ext>
+            </a:extLst>
+          </p:cNvPr>
+          <p:cNvSpPr>
+            <a:spLocks noGrp="1"/>
+          </p:cNvSpPr>
+          <p:nvPr>
+            <p:ph type="title"/>
+          </p:nvPr>
+        </p:nvSpPr>
+        <p:spPr/>
+        <p:txBody>
+          <a:bodyPr/>
+          <a:lstStyle/>
+          <a:p>
+            <a:r>
+              <a:rPr lang="en-US" dirty="0"/>
+              <a:t>Introductory Results</a:t>
+            </a:r>
+          </a:p>
+        </p:txBody>
+      </p:sp>
+      <p:pic>
+        <p:nvPicPr>
+          <p:cNvPr id="5" name="Content Placeholder 4" descr="A screenshot of a computer&#10;&#10;Description automatically generated with low confidence">
+            <a:extLst>
+              <a:ext uri="{FF2B5EF4-FFF2-40B4-BE49-F238E27FC236}">
+                <a16:creationId xmlns:a16="http://schemas.microsoft.com/office/drawing/2014/main" id="{1EF60470-88E2-7E8F-3479-21E2A5E4DC5C}"/>
+              </a:ext>
+            </a:extLst>
+          </p:cNvPr>
+          <p:cNvPicPr>
+            <a:picLocks noGrp="1" noChangeAspect="1"/>
+          </p:cNvPicPr>
+          <p:nvPr>
+            <p:ph idx="1"/>
+          </p:nvPr>
+        </p:nvPicPr>
+        <p:blipFill>
+          <a:blip r:embed="rId2"/>
+          <a:stretch>
+            <a:fillRect/>
+          </a:stretch>
+        </p:blipFill>
+        <p:spPr>
+          <a:xfrm>
+            <a:off x="2351608" y="1825625"/>
+            <a:ext cx="7488783" cy="4351338"/>
+          </a:xfrm>
+        </p:spPr>
+      </p:pic>
+    </p:spTree>
+    <p:extLst>
+      <p:ext uri="{BB962C8B-B14F-4D97-AF65-F5344CB8AC3E}">
+        <p14:creationId xmlns:p14="http://schemas.microsoft.com/office/powerpoint/2010/main" val="2365487097"/>
+      </p:ext>
+    </p:extLst>
+  </p:cSld>
+  <p:clrMapOvr>
+    <a:masterClrMapping/>
+  </p:clrMapOvr>
+</p:sld>
+</file>
+
+<file path=ppt/slides/slide18.xml><?xml version="1.0" encoding="utf-8"?>
+<p:sld xmlns:a="http://schemas.openxmlformats.org/drawingml/2006/main" xmlns:r="http://schemas.openxmlformats.org/officeDocument/2006/relationships" xmlns:p="http://schemas.openxmlformats.org/presentationml/2006/main">
+  <p:cSld>
+    <p:spTree>
+      <p:nvGrpSpPr>
+        <p:cNvPr id="1" name=""/>
+        <p:cNvGrpSpPr/>
+        <p:nvPr/>
+      </p:nvGrpSpPr>
+      <p:grpSpPr>
+        <a:xfrm>
+          <a:off x="0" y="0"/>
+          <a:ext cx="0" cy="0"/>
+          <a:chOff x="0" y="0"/>
+          <a:chExt cx="0" cy="0"/>
+        </a:xfrm>
+      </p:grpSpPr>
+      <p:sp>
+        <p:nvSpPr>
+          <p:cNvPr id="2" name="Title 1">
+            <a:extLst>
+              <a:ext uri="{FF2B5EF4-FFF2-40B4-BE49-F238E27FC236}">
                 <a16:creationId xmlns:a16="http://schemas.microsoft.com/office/drawing/2014/main" id="{341F7730-A684-F20F-3ED5-99E32A0B9531}"/>
               </a:ext>
             </a:extLst>
@@ -3501,7 +4494,7 @@
 </p:sld>
 </file>
 
-<file path=ppt/slides/slide11.xml><?xml version="1.0" encoding="utf-8"?>
+<file path=ppt/slides/slide19.xml><?xml version="1.0" encoding="utf-8"?>
 <p:sld xmlns:a="http://schemas.openxmlformats.org/drawingml/2006/main" xmlns:r="http://schemas.openxmlformats.org/officeDocument/2006/relationships" xmlns:p="http://schemas.openxmlformats.org/presentationml/2006/main">
   <p:cSld>
     <p:spTree>
@@ -3599,7 +4592,102 @@
 </p:sld>
 </file>
 
-<file path=ppt/slides/slide12.xml><?xml version="1.0" encoding="utf-8"?>
+<file path=ppt/slides/slide2.xml><?xml version="1.0" encoding="utf-8"?>
+<p:sld xmlns:a="http://schemas.openxmlformats.org/drawingml/2006/main" xmlns:r="http://schemas.openxmlformats.org/officeDocument/2006/relationships" xmlns:p="http://schemas.openxmlformats.org/presentationml/2006/main" show="0">
+  <p:cSld>
+    <p:spTree>
+      <p:nvGrpSpPr>
+        <p:cNvPr id="1" name=""/>
+        <p:cNvGrpSpPr/>
+        <p:nvPr/>
+      </p:nvGrpSpPr>
+      <p:grpSpPr>
+        <a:xfrm>
+          <a:off x="0" y="0"/>
+          <a:ext cx="0" cy="0"/>
+          <a:chOff x="0" y="0"/>
+          <a:chExt cx="0" cy="0"/>
+        </a:xfrm>
+      </p:grpSpPr>
+      <p:sp>
+        <p:nvSpPr>
+          <p:cNvPr id="2" name="Title 1">
+            <a:extLst>
+              <a:ext uri="{FF2B5EF4-FFF2-40B4-BE49-F238E27FC236}">
+                <a16:creationId xmlns:a16="http://schemas.microsoft.com/office/drawing/2014/main" id="{6F66F659-3F33-C223-ADDC-8958E4A6AC5D}"/>
+              </a:ext>
+            </a:extLst>
+          </p:cNvPr>
+          <p:cNvSpPr>
+            <a:spLocks noGrp="1"/>
+          </p:cNvSpPr>
+          <p:nvPr>
+            <p:ph type="title"/>
+          </p:nvPr>
+        </p:nvSpPr>
+        <p:spPr/>
+        <p:txBody>
+          <a:bodyPr/>
+          <a:lstStyle/>
+          <a:p>
+            <a:r>
+              <a:rPr lang="en-US" dirty="0"/>
+              <a:t>Motivation</a:t>
+            </a:r>
+          </a:p>
+        </p:txBody>
+      </p:sp>
+      <p:sp>
+        <p:nvSpPr>
+          <p:cNvPr id="3" name="Content Placeholder 2">
+            <a:extLst>
+              <a:ext uri="{FF2B5EF4-FFF2-40B4-BE49-F238E27FC236}">
+                <a16:creationId xmlns:a16="http://schemas.microsoft.com/office/drawing/2014/main" id="{AE83B8E5-A6A2-9BC5-0A8C-57823D8E14EA}"/>
+              </a:ext>
+            </a:extLst>
+          </p:cNvPr>
+          <p:cNvSpPr>
+            <a:spLocks noGrp="1"/>
+          </p:cNvSpPr>
+          <p:nvPr>
+            <p:ph idx="1"/>
+          </p:nvPr>
+        </p:nvSpPr>
+        <p:spPr/>
+        <p:txBody>
+          <a:bodyPr/>
+          <a:lstStyle/>
+          <a:p>
+            <a:r>
+              <a:rPr lang="en-US" dirty="0"/>
+              <a:t>Current state transition systems are based on heuristic</a:t>
+            </a:r>
+          </a:p>
+          <a:p>
+            <a:endParaRPr lang="en-US" dirty="0"/>
+          </a:p>
+          <a:p>
+            <a:r>
+              <a:rPr lang="en-US" dirty="0"/>
+              <a:t>We need to design a mathematical model which captures relationship between resource usage ( which might serve as a proxy for performance) and frequency(which can be used to predict power)</a:t>
+            </a:r>
+          </a:p>
+        </p:txBody>
+      </p:sp>
+    </p:spTree>
+    <p:extLst>
+      <p:ext uri="{BB962C8B-B14F-4D97-AF65-F5344CB8AC3E}">
+        <p14:creationId xmlns:p14="http://schemas.microsoft.com/office/powerpoint/2010/main" val="2782086001"/>
+      </p:ext>
+    </p:extLst>
+  </p:cSld>
+  <p:clrMapOvr>
+    <a:masterClrMapping/>
+  </p:clrMapOvr>
+</p:sld>
+</file>
+
+<file path=ppt/slides/slide20.xml><?xml version="1.0" encoding="utf-8"?>
 <p:sld xmlns:a="http://schemas.openxmlformats.org/drawingml/2006/main" xmlns:r="http://schemas.openxmlformats.org/officeDocument/2006/relationships" xmlns:p="http://schemas.openxmlformats.org/presentationml/2006/main">
   <p:cSld>
     <p:spTree>
@@ -3720,103 +4808,8 @@
 </p:sld>
 </file>
 
-<file path=ppt/slides/slide2.xml><?xml version="1.0" encoding="utf-8"?>
-<p:sld xmlns:a="http://schemas.openxmlformats.org/drawingml/2006/main" xmlns:r="http://schemas.openxmlformats.org/officeDocument/2006/relationships" xmlns:p="http://schemas.openxmlformats.org/presentationml/2006/main">
-  <p:cSld>
-    <p:spTree>
-      <p:nvGrpSpPr>
-        <p:cNvPr id="1" name=""/>
-        <p:cNvGrpSpPr/>
-        <p:nvPr/>
-      </p:nvGrpSpPr>
-      <p:grpSpPr>
-        <a:xfrm>
-          <a:off x="0" y="0"/>
-          <a:ext cx="0" cy="0"/>
-          <a:chOff x="0" y="0"/>
-          <a:chExt cx="0" cy="0"/>
-        </a:xfrm>
-      </p:grpSpPr>
-      <p:sp>
-        <p:nvSpPr>
-          <p:cNvPr id="2" name="Title 1">
-            <a:extLst>
-              <a:ext uri="{FF2B5EF4-FFF2-40B4-BE49-F238E27FC236}">
-                <a16:creationId xmlns:a16="http://schemas.microsoft.com/office/drawing/2014/main" id="{6F66F659-3F33-C223-ADDC-8958E4A6AC5D}"/>
-              </a:ext>
-            </a:extLst>
-          </p:cNvPr>
-          <p:cNvSpPr>
-            <a:spLocks noGrp="1"/>
-          </p:cNvSpPr>
-          <p:nvPr>
-            <p:ph type="title"/>
-          </p:nvPr>
-        </p:nvSpPr>
-        <p:spPr/>
-        <p:txBody>
-          <a:bodyPr/>
-          <a:lstStyle/>
-          <a:p>
-            <a:r>
-              <a:rPr lang="en-US" dirty="0"/>
-              <a:t>Motivation</a:t>
-            </a:r>
-          </a:p>
-        </p:txBody>
-      </p:sp>
-      <p:sp>
-        <p:nvSpPr>
-          <p:cNvPr id="3" name="Content Placeholder 2">
-            <a:extLst>
-              <a:ext uri="{FF2B5EF4-FFF2-40B4-BE49-F238E27FC236}">
-                <a16:creationId xmlns:a16="http://schemas.microsoft.com/office/drawing/2014/main" id="{AE83B8E5-A6A2-9BC5-0A8C-57823D8E14EA}"/>
-              </a:ext>
-            </a:extLst>
-          </p:cNvPr>
-          <p:cNvSpPr>
-            <a:spLocks noGrp="1"/>
-          </p:cNvSpPr>
-          <p:nvPr>
-            <p:ph idx="1"/>
-          </p:nvPr>
-        </p:nvSpPr>
-        <p:spPr/>
-        <p:txBody>
-          <a:bodyPr/>
-          <a:lstStyle/>
-          <a:p>
-            <a:r>
-              <a:rPr lang="en-US" dirty="0"/>
-              <a:t>Current state transition systems are based on heuristic</a:t>
-            </a:r>
-          </a:p>
-          <a:p>
-            <a:endParaRPr lang="en-US" dirty="0"/>
-          </a:p>
-          <a:p>
-            <a:r>
-              <a:rPr lang="en-US" dirty="0"/>
-              <a:t>We need to design a mathematical model which captures relationship between resource usage ( which might serve as a proxy for performance) and frequency(which can be used to predict power)</a:t>
-            </a:r>
-          </a:p>
-        </p:txBody>
-      </p:sp>
-    </p:spTree>
-    <p:extLst>
-      <p:ext uri="{BB962C8B-B14F-4D97-AF65-F5344CB8AC3E}">
-        <p14:creationId xmlns:p14="http://schemas.microsoft.com/office/powerpoint/2010/main" val="2782086001"/>
-      </p:ext>
-    </p:extLst>
-  </p:cSld>
-  <p:clrMapOvr>
-    <a:masterClrMapping/>
-  </p:clrMapOvr>
-</p:sld>
-</file>
-
 <file path=ppt/slides/slide3.xml><?xml version="1.0" encoding="utf-8"?>
-<p:sld xmlns:a="http://schemas.openxmlformats.org/drawingml/2006/main" xmlns:r="http://schemas.openxmlformats.org/officeDocument/2006/relationships" xmlns:p="http://schemas.openxmlformats.org/presentationml/2006/main">
+<p:sld xmlns:a="http://schemas.openxmlformats.org/drawingml/2006/main" xmlns:r="http://schemas.openxmlformats.org/officeDocument/2006/relationships" xmlns:p="http://schemas.openxmlformats.org/presentationml/2006/main" show="0">
   <p:cSld>
     <p:spTree>
       <p:nvGrpSpPr>
@@ -3944,6 +4937,196 @@
           <p:cNvPr id="2" name="Title 1">
             <a:extLst>
               <a:ext uri="{FF2B5EF4-FFF2-40B4-BE49-F238E27FC236}">
+                <a16:creationId xmlns:a16="http://schemas.microsoft.com/office/drawing/2014/main" id="{097FEF6B-BDFB-0D67-970B-E5B802DD0F52}"/>
+              </a:ext>
+            </a:extLst>
+          </p:cNvPr>
+          <p:cNvSpPr>
+            <a:spLocks noGrp="1"/>
+          </p:cNvSpPr>
+          <p:nvPr>
+            <p:ph type="title"/>
+          </p:nvPr>
+        </p:nvSpPr>
+        <p:spPr/>
+        <p:txBody>
+          <a:bodyPr/>
+          <a:lstStyle/>
+          <a:p>
+            <a:r>
+              <a:rPr lang="en-US" dirty="0"/>
+              <a:t>Motivation</a:t>
+            </a:r>
+          </a:p>
+        </p:txBody>
+      </p:sp>
+      <p:sp>
+        <p:nvSpPr>
+          <p:cNvPr id="3" name="Content Placeholder 2">
+            <a:extLst>
+              <a:ext uri="{FF2B5EF4-FFF2-40B4-BE49-F238E27FC236}">
+                <a16:creationId xmlns:a16="http://schemas.microsoft.com/office/drawing/2014/main" id="{E404C2C3-32E3-72E0-298B-38352074F220}"/>
+              </a:ext>
+            </a:extLst>
+          </p:cNvPr>
+          <p:cNvSpPr>
+            <a:spLocks noGrp="1"/>
+          </p:cNvSpPr>
+          <p:nvPr>
+            <p:ph idx="1"/>
+          </p:nvPr>
+        </p:nvSpPr>
+        <p:spPr/>
+        <p:txBody>
+          <a:bodyPr/>
+          <a:lstStyle/>
+          <a:p>
+            <a:r>
+              <a:rPr lang="en-US" dirty="0"/>
+              <a:t>Characterize the state transition based on the interplay among different resources</a:t>
+            </a:r>
+          </a:p>
+          <a:p>
+            <a:r>
+              <a:rPr lang="en-US" dirty="0"/>
+              <a:t>Formal modeling helps us devise a metric which helps us to quantify and optimize the process</a:t>
+            </a:r>
+          </a:p>
+        </p:txBody>
+      </p:sp>
+    </p:spTree>
+    <p:extLst>
+      <p:ext uri="{BB962C8B-B14F-4D97-AF65-F5344CB8AC3E}">
+        <p14:creationId xmlns:p14="http://schemas.microsoft.com/office/powerpoint/2010/main" val="706710087"/>
+      </p:ext>
+    </p:extLst>
+  </p:cSld>
+  <p:clrMapOvr>
+    <a:masterClrMapping/>
+  </p:clrMapOvr>
+</p:sld>
+</file>
+
+<file path=ppt/slides/slide5.xml><?xml version="1.0" encoding="utf-8"?>
+<p:sld xmlns:a="http://schemas.openxmlformats.org/drawingml/2006/main" xmlns:r="http://schemas.openxmlformats.org/officeDocument/2006/relationships" xmlns:p="http://schemas.openxmlformats.org/presentationml/2006/main">
+  <p:cSld>
+    <p:spTree>
+      <p:nvGrpSpPr>
+        <p:cNvPr id="1" name=""/>
+        <p:cNvGrpSpPr/>
+        <p:nvPr/>
+      </p:nvGrpSpPr>
+      <p:grpSpPr>
+        <a:xfrm>
+          <a:off x="0" y="0"/>
+          <a:ext cx="0" cy="0"/>
+          <a:chOff x="0" y="0"/>
+          <a:chExt cx="0" cy="0"/>
+        </a:xfrm>
+      </p:grpSpPr>
+      <p:sp>
+        <p:nvSpPr>
+          <p:cNvPr id="2" name="Title 1">
+            <a:extLst>
+              <a:ext uri="{FF2B5EF4-FFF2-40B4-BE49-F238E27FC236}">
+                <a16:creationId xmlns:a16="http://schemas.microsoft.com/office/drawing/2014/main" id="{3375153C-1EB0-5AD4-95FA-9D072B2989D0}"/>
+              </a:ext>
+            </a:extLst>
+          </p:cNvPr>
+          <p:cNvSpPr>
+            <a:spLocks noGrp="1"/>
+          </p:cNvSpPr>
+          <p:nvPr>
+            <p:ph type="title"/>
+          </p:nvPr>
+        </p:nvSpPr>
+        <p:spPr/>
+        <p:txBody>
+          <a:bodyPr/>
+          <a:lstStyle/>
+          <a:p>
+            <a:r>
+              <a:rPr lang="en-US" dirty="0"/>
+              <a:t>Research Question</a:t>
+            </a:r>
+          </a:p>
+        </p:txBody>
+      </p:sp>
+      <p:sp>
+        <p:nvSpPr>
+          <p:cNvPr id="3" name="Content Placeholder 2">
+            <a:extLst>
+              <a:ext uri="{FF2B5EF4-FFF2-40B4-BE49-F238E27FC236}">
+                <a16:creationId xmlns:a16="http://schemas.microsoft.com/office/drawing/2014/main" id="{E8C22A0C-42C7-C515-8487-AFA423CD1AD5}"/>
+              </a:ext>
+            </a:extLst>
+          </p:cNvPr>
+          <p:cNvSpPr>
+            <a:spLocks noGrp="1"/>
+          </p:cNvSpPr>
+          <p:nvPr>
+            <p:ph idx="1"/>
+          </p:nvPr>
+        </p:nvSpPr>
+        <p:spPr/>
+        <p:txBody>
+          <a:bodyPr/>
+          <a:lstStyle/>
+          <a:p>
+            <a:r>
+              <a:rPr lang="en-US" dirty="0"/>
+              <a:t>How efficient are the current state transition methods?</a:t>
+            </a:r>
+          </a:p>
+          <a:p>
+            <a:r>
+              <a:rPr lang="en-US" dirty="0"/>
+              <a:t>Can the current and past state and workload help predict the appropriate state?</a:t>
+            </a:r>
+          </a:p>
+          <a:p>
+            <a:r>
+              <a:rPr lang="en-US" dirty="0"/>
+              <a:t>Is the relationship among different parameters linear or non-linear?</a:t>
+            </a:r>
+          </a:p>
+        </p:txBody>
+      </p:sp>
+    </p:spTree>
+    <p:extLst>
+      <p:ext uri="{BB962C8B-B14F-4D97-AF65-F5344CB8AC3E}">
+        <p14:creationId xmlns:p14="http://schemas.microsoft.com/office/powerpoint/2010/main" val="1686756242"/>
+      </p:ext>
+    </p:extLst>
+  </p:cSld>
+  <p:clrMapOvr>
+    <a:masterClrMapping/>
+  </p:clrMapOvr>
+</p:sld>
+</file>
+
+<file path=ppt/slides/slide6.xml><?xml version="1.0" encoding="utf-8"?>
+<p:sld xmlns:a="http://schemas.openxmlformats.org/drawingml/2006/main" xmlns:r="http://schemas.openxmlformats.org/officeDocument/2006/relationships" xmlns:p="http://schemas.openxmlformats.org/presentationml/2006/main">
+  <p:cSld>
+    <p:spTree>
+      <p:nvGrpSpPr>
+        <p:cNvPr id="1" name=""/>
+        <p:cNvGrpSpPr/>
+        <p:nvPr/>
+      </p:nvGrpSpPr>
+      <p:grpSpPr>
+        <a:xfrm>
+          <a:off x="0" y="0"/>
+          <a:ext cx="0" cy="0"/>
+          <a:chOff x="0" y="0"/>
+          <a:chExt cx="0" cy="0"/>
+        </a:xfrm>
+      </p:grpSpPr>
+      <p:sp>
+        <p:nvSpPr>
+          <p:cNvPr id="2" name="Title 1">
+            <a:extLst>
+              <a:ext uri="{FF2B5EF4-FFF2-40B4-BE49-F238E27FC236}">
                 <a16:creationId xmlns:a16="http://schemas.microsoft.com/office/drawing/2014/main" id="{F42B0DA6-9F7A-8832-78F1-85B56FF34C4E}"/>
               </a:ext>
             </a:extLst>
@@ -3962,13 +5145,13 @@
           <a:p>
             <a:r>
               <a:rPr lang="en-US" dirty="0"/>
-              <a:t>Approach 1</a:t>
-            </a:r>
-          </a:p>
-        </p:txBody>
-      </p:sp>
-      <mc:AlternateContent xmlns:mc="http://schemas.openxmlformats.org/markup-compatibility/2006" xmlns:a14="http://schemas.microsoft.com/office/drawing/2010/main">
-        <mc:Choice Requires="a14">
+              <a:t>Approach</a:t>
+            </a:r>
+          </a:p>
+        </p:txBody>
+      </p:sp>
+      <mc:AlternateContent xmlns:mc="http://schemas.openxmlformats.org/markup-compatibility/2006">
+        <mc:Choice xmlns:a14="http://schemas.microsoft.com/office/drawing/2010/main" Requires="a14">
           <p:sp>
             <p:nvSpPr>
               <p:cNvPr id="3" name="Content Placeholder 2">
@@ -3994,8 +5177,20 @@
                   <a:buNone/>
                 </a:pPr>
                 <a:r>
+                  <a:rPr lang="en-US" dirty="0">
+                    <a:sym typeface="Wingdings" pitchFamily="2" charset="2"/>
+                  </a:rPr>
+                  <a:t> ARMAX model</a:t>
+                </a:r>
+                <a:endParaRPr lang="en-US" dirty="0"/>
+              </a:p>
+              <a:p>
+                <a:pPr marL="0" indent="0">
+                  <a:buNone/>
+                </a:pPr>
+                <a:r>
                   <a:rPr lang="en-US" dirty="0"/>
-                  <a:t>Assume the the utilization follow an Auto regressive behavior with frequency and the control parameter</a:t>
+                  <a:t>Assume auto regressive behavior for the frequency and the utilization</a:t>
                 </a:r>
               </a:p>
               <a:p>
@@ -4005,340 +5200,646 @@
                 <a:endParaRPr lang="en-US" dirty="0"/>
               </a:p>
               <a:p>
-                <a:pPr marL="0" indent="0">
-                  <a:buNone/>
-                </a:pPr>
                 <a14:m>
-                  <m:oMathPara xmlns:m="http://schemas.openxmlformats.org/officeDocument/2006/math">
-                    <m:oMathParaPr>
-                      <m:jc m:val="centerGroup"/>
-                    </m:oMathParaPr>
-                    <m:oMath xmlns:m="http://schemas.openxmlformats.org/officeDocument/2006/math">
-                      <m:r>
-                        <a:rPr lang="en-US" b="0" i="1" smtClean="0">
-                          <a:latin typeface="Cambria Math" panose="02040503050406030204" pitchFamily="18" charset="0"/>
-                        </a:rPr>
-                        <m:t>𝑢𝑡𝑖</m:t>
-                      </m:r>
-                      <m:sSub>
-                        <m:sSubPr>
-                          <m:ctrlPr>
-                            <a:rPr lang="en-US" b="0" i="1" smtClean="0">
-                              <a:latin typeface="Cambria Math" panose="02040503050406030204" pitchFamily="18" charset="0"/>
-                            </a:rPr>
-                          </m:ctrlPr>
-                        </m:sSubPr>
-                        <m:e>
-                          <m:r>
-                            <a:rPr lang="en-US" b="0" i="1" smtClean="0">
-                              <a:latin typeface="Cambria Math" panose="02040503050406030204" pitchFamily="18" charset="0"/>
-                            </a:rPr>
-                            <m:t>𝑙</m:t>
-                          </m:r>
-                        </m:e>
-                        <m:sub>
-                          <m:r>
-                            <a:rPr lang="en-US" b="0" i="1" smtClean="0">
-                              <a:latin typeface="Cambria Math" panose="02040503050406030204" pitchFamily="18" charset="0"/>
-                            </a:rPr>
-                            <m:t>𝑡</m:t>
-                          </m:r>
-                        </m:sub>
-                      </m:sSub>
-                      <m:r>
-                        <a:rPr lang="en-US" b="0" i="1" smtClean="0">
-                          <a:latin typeface="Cambria Math" panose="02040503050406030204" pitchFamily="18" charset="0"/>
-                        </a:rPr>
-                        <m:t>=</m:t>
-                      </m:r>
-                      <m:sSub>
-                        <m:sSubPr>
-                          <m:ctrlPr>
-                            <a:rPr lang="en-US" b="0" i="1" smtClean="0">
-                              <a:latin typeface="Cambria Math" panose="02040503050406030204" pitchFamily="18" charset="0"/>
-                            </a:rPr>
-                          </m:ctrlPr>
-                        </m:sSubPr>
-                        <m:e>
-                          <m:r>
-                            <a:rPr lang="en-US" b="0" i="1" smtClean="0">
-                              <a:latin typeface="Cambria Math" panose="02040503050406030204" pitchFamily="18" charset="0"/>
-                            </a:rPr>
-                            <m:t>𝛼</m:t>
-                          </m:r>
-                        </m:e>
-                        <m:sub>
-                          <m:r>
-                            <a:rPr lang="en-US" b="0" i="1" smtClean="0">
-                              <a:latin typeface="Cambria Math" panose="02040503050406030204" pitchFamily="18" charset="0"/>
-                            </a:rPr>
-                            <m:t>1</m:t>
-                          </m:r>
-                        </m:sub>
-                      </m:sSub>
-                      <m:r>
-                        <a:rPr lang="en-US" b="0" i="1" smtClean="0">
-                          <a:latin typeface="Cambria Math" panose="02040503050406030204" pitchFamily="18" charset="0"/>
-                        </a:rPr>
-                        <m:t>𝑢𝑡𝑖</m:t>
-                      </m:r>
-                      <m:sSub>
-                        <m:sSubPr>
-                          <m:ctrlPr>
-                            <a:rPr lang="en-US" b="0" i="1" smtClean="0">
-                              <a:latin typeface="Cambria Math" panose="02040503050406030204" pitchFamily="18" charset="0"/>
-                            </a:rPr>
-                          </m:ctrlPr>
-                        </m:sSubPr>
-                        <m:e>
-                          <m:r>
-                            <a:rPr lang="en-US" b="0" i="1" smtClean="0">
-                              <a:latin typeface="Cambria Math" panose="02040503050406030204" pitchFamily="18" charset="0"/>
-                            </a:rPr>
-                            <m:t>𝑙</m:t>
-                          </m:r>
-                        </m:e>
-                        <m:sub>
-                          <m:r>
-                            <a:rPr lang="en-US" b="0" i="1" smtClean="0">
-                              <a:latin typeface="Cambria Math" panose="02040503050406030204" pitchFamily="18" charset="0"/>
-                            </a:rPr>
-                            <m:t>𝑡</m:t>
-                          </m:r>
-                          <m:r>
-                            <a:rPr lang="en-US" b="0" i="1" smtClean="0">
-                              <a:latin typeface="Cambria Math" panose="02040503050406030204" pitchFamily="18" charset="0"/>
-                            </a:rPr>
-                            <m:t>−1</m:t>
-                          </m:r>
-                        </m:sub>
-                      </m:sSub>
-                      <m:r>
-                        <a:rPr lang="en-US" b="0" i="1" smtClean="0">
-                          <a:latin typeface="Cambria Math" panose="02040503050406030204" pitchFamily="18" charset="0"/>
-                        </a:rPr>
-                        <m:t>+</m:t>
-                      </m:r>
-                      <m:sSub>
-                        <m:sSubPr>
-                          <m:ctrlPr>
-                            <a:rPr lang="en-US" b="0" i="1" smtClean="0">
-                              <a:latin typeface="Cambria Math" panose="02040503050406030204" pitchFamily="18" charset="0"/>
-                            </a:rPr>
-                          </m:ctrlPr>
-                        </m:sSubPr>
-                        <m:e>
-                          <m:r>
-                            <a:rPr lang="en-US" b="0" i="1" smtClean="0">
-                              <a:latin typeface="Cambria Math" panose="02040503050406030204" pitchFamily="18" charset="0"/>
-                            </a:rPr>
-                            <m:t>𝛼</m:t>
-                          </m:r>
-                        </m:e>
-                        <m:sub>
-                          <m:r>
-                            <a:rPr lang="en-US" b="0" i="1" smtClean="0">
-                              <a:latin typeface="Cambria Math" panose="02040503050406030204" pitchFamily="18" charset="0"/>
-                            </a:rPr>
-                            <m:t>2</m:t>
-                          </m:r>
-                        </m:sub>
-                      </m:sSub>
-                      <m:r>
-                        <a:rPr lang="en-US" b="0" i="1" smtClean="0">
-                          <a:latin typeface="Cambria Math" panose="02040503050406030204" pitchFamily="18" charset="0"/>
-                        </a:rPr>
-                        <m:t>𝑢𝑡𝑖</m:t>
-                      </m:r>
-                      <m:sSub>
-                        <m:sSubPr>
-                          <m:ctrlPr>
-                            <a:rPr lang="en-US" b="0" i="1" smtClean="0">
-                              <a:latin typeface="Cambria Math" panose="02040503050406030204" pitchFamily="18" charset="0"/>
-                            </a:rPr>
-                          </m:ctrlPr>
-                        </m:sSubPr>
-                        <m:e>
-                          <m:r>
-                            <a:rPr lang="en-US" b="0" i="1" smtClean="0">
-                              <a:latin typeface="Cambria Math" panose="02040503050406030204" pitchFamily="18" charset="0"/>
-                            </a:rPr>
-                            <m:t>𝑙</m:t>
-                          </m:r>
-                        </m:e>
-                        <m:sub>
-                          <m:r>
-                            <a:rPr lang="en-US" b="0" i="1" smtClean="0">
-                              <a:latin typeface="Cambria Math" panose="02040503050406030204" pitchFamily="18" charset="0"/>
-                            </a:rPr>
-                            <m:t>𝑡</m:t>
-                          </m:r>
-                          <m:r>
-                            <a:rPr lang="en-US" b="0" i="1" smtClean="0">
-                              <a:latin typeface="Cambria Math" panose="02040503050406030204" pitchFamily="18" charset="0"/>
-                            </a:rPr>
-                            <m:t>−2</m:t>
-                          </m:r>
-                        </m:sub>
-                      </m:sSub>
-                      <m:r>
-                        <a:rPr lang="en-US" b="0" i="1" smtClean="0">
-                          <a:latin typeface="Cambria Math" panose="02040503050406030204" pitchFamily="18" charset="0"/>
-                        </a:rPr>
-                        <m:t>+ .. +</m:t>
-                      </m:r>
-                      <m:sSub>
-                        <m:sSubPr>
-                          <m:ctrlPr>
-                            <a:rPr lang="en-US" b="0" i="1" smtClean="0">
-                              <a:latin typeface="Cambria Math" panose="02040503050406030204" pitchFamily="18" charset="0"/>
-                            </a:rPr>
-                          </m:ctrlPr>
-                        </m:sSubPr>
-                        <m:e>
-                          <m:r>
-                            <a:rPr lang="en-US" b="0" i="1" smtClean="0">
-                              <a:latin typeface="Cambria Math" panose="02040503050406030204" pitchFamily="18" charset="0"/>
-                            </a:rPr>
-                            <m:t>𝛽</m:t>
-                          </m:r>
-                        </m:e>
-                        <m:sub>
-                          <m:r>
-                            <a:rPr lang="en-US" b="0" i="1" smtClean="0">
-                              <a:latin typeface="Cambria Math" panose="02040503050406030204" pitchFamily="18" charset="0"/>
-                            </a:rPr>
-                            <m:t>1</m:t>
-                          </m:r>
-                        </m:sub>
-                      </m:sSub>
-                      <m:r>
-                        <a:rPr lang="en-US" b="0" i="1" smtClean="0">
-                          <a:latin typeface="Cambria Math" panose="02040503050406030204" pitchFamily="18" charset="0"/>
-                        </a:rPr>
-                        <m:t>𝑖𝑛𝑝</m:t>
-                      </m:r>
-                      <m:r>
-                        <a:rPr lang="en-US" b="0" i="1" smtClean="0">
-                          <a:latin typeface="Cambria Math" panose="02040503050406030204" pitchFamily="18" charset="0"/>
-                        </a:rPr>
-                        <m:t>+</m:t>
-                      </m:r>
-                      <m:sSub>
-                        <m:sSubPr>
-                          <m:ctrlPr>
-                            <a:rPr lang="en-US" b="0" i="1" smtClean="0">
-                              <a:latin typeface="Cambria Math" panose="02040503050406030204" pitchFamily="18" charset="0"/>
-                            </a:rPr>
-                          </m:ctrlPr>
-                        </m:sSubPr>
-                        <m:e>
-                          <m:r>
-                            <a:rPr lang="en-US" b="0" i="1" smtClean="0">
-                              <a:latin typeface="Cambria Math" panose="02040503050406030204" pitchFamily="18" charset="0"/>
-                            </a:rPr>
-                            <m:t>𝛾</m:t>
-                          </m:r>
-                        </m:e>
-                        <m:sub>
-                          <m:r>
-                            <a:rPr lang="en-US" b="0" i="1" smtClean="0">
-                              <a:latin typeface="Cambria Math" panose="02040503050406030204" pitchFamily="18" charset="0"/>
-                            </a:rPr>
-                            <m:t>1</m:t>
-                          </m:r>
-                        </m:sub>
-                      </m:sSub>
-                      <m:sSub>
-                        <m:sSubPr>
-                          <m:ctrlPr>
-                            <a:rPr lang="en-US" b="0" i="1" smtClean="0">
-                              <a:latin typeface="Cambria Math" panose="02040503050406030204" pitchFamily="18" charset="0"/>
-                            </a:rPr>
-                          </m:ctrlPr>
-                        </m:sSubPr>
-                        <m:e>
-                          <m:r>
-                            <a:rPr lang="en-US" b="0" i="1" smtClean="0">
-                              <a:latin typeface="Cambria Math" panose="02040503050406030204" pitchFamily="18" charset="0"/>
-                            </a:rPr>
-                            <m:t>𝜖</m:t>
-                          </m:r>
-                        </m:e>
-                        <m:sub>
-                          <m:r>
-                            <a:rPr lang="en-US" b="0" i="1" smtClean="0">
-                              <a:latin typeface="Cambria Math" panose="02040503050406030204" pitchFamily="18" charset="0"/>
-                            </a:rPr>
-                            <m:t>1</m:t>
-                          </m:r>
-                        </m:sub>
-                      </m:sSub>
-                      <m:r>
-                        <a:rPr lang="en-US" b="0" i="1" smtClean="0">
-                          <a:latin typeface="Cambria Math" panose="02040503050406030204" pitchFamily="18" charset="0"/>
-                        </a:rPr>
-                        <m:t>+</m:t>
-                      </m:r>
-                      <m:sSub>
-                        <m:sSubPr>
-                          <m:ctrlPr>
-                            <a:rPr lang="en-US" b="0" i="1" smtClean="0">
-                              <a:latin typeface="Cambria Math" panose="02040503050406030204" pitchFamily="18" charset="0"/>
-                            </a:rPr>
-                          </m:ctrlPr>
-                        </m:sSubPr>
-                        <m:e>
-                          <m:r>
-                            <a:rPr lang="en-US" b="0" i="1" smtClean="0">
-                              <a:latin typeface="Cambria Math" panose="02040503050406030204" pitchFamily="18" charset="0"/>
-                            </a:rPr>
-                            <m:t>𝛾</m:t>
-                          </m:r>
-                        </m:e>
-                        <m:sub>
-                          <m:r>
-                            <a:rPr lang="en-US" b="0" i="1" smtClean="0">
-                              <a:latin typeface="Cambria Math" panose="02040503050406030204" pitchFamily="18" charset="0"/>
-                            </a:rPr>
-                            <m:t>2</m:t>
-                          </m:r>
-                        </m:sub>
-                      </m:sSub>
-                      <m:sSub>
-                        <m:sSubPr>
-                          <m:ctrlPr>
-                            <a:rPr lang="en-US" b="0" i="1" smtClean="0">
-                              <a:latin typeface="Cambria Math" panose="02040503050406030204" pitchFamily="18" charset="0"/>
-                            </a:rPr>
-                          </m:ctrlPr>
-                        </m:sSubPr>
-                        <m:e>
-                          <m:r>
-                            <a:rPr lang="en-US" b="0" i="1" smtClean="0">
-                              <a:latin typeface="Cambria Math" panose="02040503050406030204" pitchFamily="18" charset="0"/>
-                            </a:rPr>
-                            <m:t>𝜖</m:t>
-                          </m:r>
-                        </m:e>
-                        <m:sub>
-                          <m:r>
-                            <a:rPr lang="en-US" b="0" i="1" smtClean="0">
-                              <a:latin typeface="Cambria Math" panose="02040503050406030204" pitchFamily="18" charset="0"/>
-                            </a:rPr>
-                            <m:t>2</m:t>
-                          </m:r>
-                        </m:sub>
-                      </m:sSub>
-                    </m:oMath>
-                  </m:oMathPara>
+                  <m:oMath xmlns:m="http://schemas.openxmlformats.org/officeDocument/2006/math">
+                    <m:r>
+                      <a:rPr lang="en-US" b="0" i="1" smtClean="0">
+                        <a:latin typeface="Cambria Math" panose="02040503050406030204" pitchFamily="18" charset="0"/>
+                      </a:rPr>
+                      <m:t>𝑢𝑡𝑖</m:t>
+                    </m:r>
+                    <m:sSub>
+                      <m:sSubPr>
+                        <m:ctrlPr>
+                          <a:rPr lang="en-US" b="0" i="1" smtClean="0">
+                            <a:latin typeface="Cambria Math" panose="02040503050406030204" pitchFamily="18" charset="0"/>
+                          </a:rPr>
+                        </m:ctrlPr>
+                      </m:sSubPr>
+                      <m:e>
+                        <m:r>
+                          <a:rPr lang="en-US" b="0" i="1" smtClean="0">
+                            <a:latin typeface="Cambria Math" panose="02040503050406030204" pitchFamily="18" charset="0"/>
+                          </a:rPr>
+                          <m:t>𝑙</m:t>
+                        </m:r>
+                      </m:e>
+                      <m:sub>
+                        <m:r>
+                          <a:rPr lang="en-US" b="0" i="1" smtClean="0">
+                            <a:latin typeface="Cambria Math" panose="02040503050406030204" pitchFamily="18" charset="0"/>
+                          </a:rPr>
+                          <m:t>𝑡</m:t>
+                        </m:r>
+                      </m:sub>
+                    </m:sSub>
+                    <m:r>
+                      <a:rPr lang="en-US" b="0" i="1" smtClean="0">
+                        <a:latin typeface="Cambria Math" panose="02040503050406030204" pitchFamily="18" charset="0"/>
+                      </a:rPr>
+                      <m:t>=</m:t>
+                    </m:r>
+                    <m:sSub>
+                      <m:sSubPr>
+                        <m:ctrlPr>
+                          <a:rPr lang="en-US" b="0" i="1" smtClean="0">
+                            <a:latin typeface="Cambria Math" panose="02040503050406030204" pitchFamily="18" charset="0"/>
+                          </a:rPr>
+                        </m:ctrlPr>
+                      </m:sSubPr>
+                      <m:e>
+                        <m:r>
+                          <a:rPr lang="en-US" b="0" i="1" smtClean="0">
+                            <a:latin typeface="Cambria Math" panose="02040503050406030204" pitchFamily="18" charset="0"/>
+                          </a:rPr>
+                          <m:t>𝛼</m:t>
+                        </m:r>
+                      </m:e>
+                      <m:sub>
+                        <m:r>
+                          <a:rPr lang="en-US" b="0" i="1" smtClean="0">
+                            <a:latin typeface="Cambria Math" panose="02040503050406030204" pitchFamily="18" charset="0"/>
+                          </a:rPr>
+                          <m:t>1</m:t>
+                        </m:r>
+                      </m:sub>
+                    </m:sSub>
+                    <m:r>
+                      <a:rPr lang="en-US" b="0" i="1" smtClean="0">
+                        <a:latin typeface="Cambria Math" panose="02040503050406030204" pitchFamily="18" charset="0"/>
+                      </a:rPr>
+                      <m:t>𝑢𝑡𝑖</m:t>
+                    </m:r>
+                    <m:sSub>
+                      <m:sSubPr>
+                        <m:ctrlPr>
+                          <a:rPr lang="en-US" b="0" i="1" smtClean="0">
+                            <a:latin typeface="Cambria Math" panose="02040503050406030204" pitchFamily="18" charset="0"/>
+                          </a:rPr>
+                        </m:ctrlPr>
+                      </m:sSubPr>
+                      <m:e>
+                        <m:r>
+                          <a:rPr lang="en-US" b="0" i="1" smtClean="0">
+                            <a:latin typeface="Cambria Math" panose="02040503050406030204" pitchFamily="18" charset="0"/>
+                          </a:rPr>
+                          <m:t>𝑙</m:t>
+                        </m:r>
+                      </m:e>
+                      <m:sub>
+                        <m:r>
+                          <a:rPr lang="en-US" b="0" i="1" smtClean="0">
+                            <a:latin typeface="Cambria Math" panose="02040503050406030204" pitchFamily="18" charset="0"/>
+                          </a:rPr>
+                          <m:t>𝑡</m:t>
+                        </m:r>
+                        <m:r>
+                          <a:rPr lang="en-US" b="0" i="1" smtClean="0">
+                            <a:latin typeface="Cambria Math" panose="02040503050406030204" pitchFamily="18" charset="0"/>
+                          </a:rPr>
+                          <m:t>−1</m:t>
+                        </m:r>
+                      </m:sub>
+                    </m:sSub>
+                    <m:r>
+                      <a:rPr lang="en-US" b="0" i="1" smtClean="0">
+                        <a:latin typeface="Cambria Math" panose="02040503050406030204" pitchFamily="18" charset="0"/>
+                      </a:rPr>
+                      <m:t>+</m:t>
+                    </m:r>
+                    <m:sSub>
+                      <m:sSubPr>
+                        <m:ctrlPr>
+                          <a:rPr lang="en-US" b="0" i="1" smtClean="0">
+                            <a:latin typeface="Cambria Math" panose="02040503050406030204" pitchFamily="18" charset="0"/>
+                          </a:rPr>
+                        </m:ctrlPr>
+                      </m:sSubPr>
+                      <m:e>
+                        <m:r>
+                          <a:rPr lang="en-US" b="0" i="1" smtClean="0">
+                            <a:latin typeface="Cambria Math" panose="02040503050406030204" pitchFamily="18" charset="0"/>
+                          </a:rPr>
+                          <m:t>𝛼</m:t>
+                        </m:r>
+                      </m:e>
+                      <m:sub>
+                        <m:r>
+                          <a:rPr lang="en-US" b="0" i="1" smtClean="0">
+                            <a:latin typeface="Cambria Math" panose="02040503050406030204" pitchFamily="18" charset="0"/>
+                          </a:rPr>
+                          <m:t>2</m:t>
+                        </m:r>
+                      </m:sub>
+                    </m:sSub>
+                    <m:r>
+                      <a:rPr lang="en-US" b="0" i="1" smtClean="0">
+                        <a:latin typeface="Cambria Math" panose="02040503050406030204" pitchFamily="18" charset="0"/>
+                      </a:rPr>
+                      <m:t>𝑢𝑡𝑖</m:t>
+                    </m:r>
+                    <m:sSub>
+                      <m:sSubPr>
+                        <m:ctrlPr>
+                          <a:rPr lang="en-US" b="0" i="1" smtClean="0">
+                            <a:latin typeface="Cambria Math" panose="02040503050406030204" pitchFamily="18" charset="0"/>
+                          </a:rPr>
+                        </m:ctrlPr>
+                      </m:sSubPr>
+                      <m:e>
+                        <m:r>
+                          <a:rPr lang="en-US" b="0" i="1" smtClean="0">
+                            <a:latin typeface="Cambria Math" panose="02040503050406030204" pitchFamily="18" charset="0"/>
+                          </a:rPr>
+                          <m:t>𝑙</m:t>
+                        </m:r>
+                      </m:e>
+                      <m:sub>
+                        <m:r>
+                          <a:rPr lang="en-US" b="0" i="1" smtClean="0">
+                            <a:latin typeface="Cambria Math" panose="02040503050406030204" pitchFamily="18" charset="0"/>
+                          </a:rPr>
+                          <m:t>𝑡</m:t>
+                        </m:r>
+                        <m:r>
+                          <a:rPr lang="en-US" b="0" i="1" smtClean="0">
+                            <a:latin typeface="Cambria Math" panose="02040503050406030204" pitchFamily="18" charset="0"/>
+                          </a:rPr>
+                          <m:t>−2</m:t>
+                        </m:r>
+                      </m:sub>
+                    </m:sSub>
+                    <m:r>
+                      <a:rPr lang="en-US" b="0" i="1" smtClean="0">
+                        <a:latin typeface="Cambria Math" panose="02040503050406030204" pitchFamily="18" charset="0"/>
+                      </a:rPr>
+                      <m:t>+ .. +</m:t>
+                    </m:r>
+                    <m:sSub>
+                      <m:sSubPr>
+                        <m:ctrlPr>
+                          <a:rPr lang="en-US" b="0" i="1" smtClean="0">
+                            <a:latin typeface="Cambria Math" panose="02040503050406030204" pitchFamily="18" charset="0"/>
+                          </a:rPr>
+                        </m:ctrlPr>
+                      </m:sSubPr>
+                      <m:e>
+                        <m:r>
+                          <a:rPr lang="en-US" b="0" i="1" smtClean="0">
+                            <a:latin typeface="Cambria Math" panose="02040503050406030204" pitchFamily="18" charset="0"/>
+                          </a:rPr>
+                          <m:t>𝛽</m:t>
+                        </m:r>
+                      </m:e>
+                      <m:sub>
+                        <m:r>
+                          <a:rPr lang="en-US" b="0" i="1" smtClean="0">
+                            <a:latin typeface="Cambria Math" panose="02040503050406030204" pitchFamily="18" charset="0"/>
+                          </a:rPr>
+                          <m:t>1</m:t>
+                        </m:r>
+                      </m:sub>
+                    </m:sSub>
+                    <m:r>
+                      <a:rPr lang="en-US" b="0" i="1" smtClean="0">
+                        <a:latin typeface="Cambria Math" panose="02040503050406030204" pitchFamily="18" charset="0"/>
+                      </a:rPr>
+                      <m:t>𝑖𝑛𝑝</m:t>
+                    </m:r>
+                    <m:r>
+                      <a:rPr lang="en-US" b="0" i="1" smtClean="0">
+                        <a:latin typeface="Cambria Math" panose="02040503050406030204" pitchFamily="18" charset="0"/>
+                      </a:rPr>
+                      <m:t>+</m:t>
+                    </m:r>
+                    <m:sSub>
+                      <m:sSubPr>
+                        <m:ctrlPr>
+                          <a:rPr lang="en-US" b="0" i="1" smtClean="0">
+                            <a:latin typeface="Cambria Math" panose="02040503050406030204" pitchFamily="18" charset="0"/>
+                          </a:rPr>
+                        </m:ctrlPr>
+                      </m:sSubPr>
+                      <m:e>
+                        <m:r>
+                          <a:rPr lang="en-US" b="0" i="1" smtClean="0">
+                            <a:latin typeface="Cambria Math" panose="02040503050406030204" pitchFamily="18" charset="0"/>
+                          </a:rPr>
+                          <m:t>𝛾</m:t>
+                        </m:r>
+                      </m:e>
+                      <m:sub>
+                        <m:r>
+                          <a:rPr lang="en-US" b="0" i="1" smtClean="0">
+                            <a:latin typeface="Cambria Math" panose="02040503050406030204" pitchFamily="18" charset="0"/>
+                          </a:rPr>
+                          <m:t>1</m:t>
+                        </m:r>
+                      </m:sub>
+                    </m:sSub>
+                    <m:sSub>
+                      <m:sSubPr>
+                        <m:ctrlPr>
+                          <a:rPr lang="en-US" b="0" i="1" smtClean="0">
+                            <a:latin typeface="Cambria Math" panose="02040503050406030204" pitchFamily="18" charset="0"/>
+                          </a:rPr>
+                        </m:ctrlPr>
+                      </m:sSubPr>
+                      <m:e>
+                        <m:r>
+                          <a:rPr lang="en-US" b="0" i="1" smtClean="0">
+                            <a:latin typeface="Cambria Math" panose="02040503050406030204" pitchFamily="18" charset="0"/>
+                          </a:rPr>
+                          <m:t>𝜖</m:t>
+                        </m:r>
+                      </m:e>
+                      <m:sub>
+                        <m:r>
+                          <a:rPr lang="en-US" b="0" i="1" smtClean="0">
+                            <a:latin typeface="Cambria Math" panose="02040503050406030204" pitchFamily="18" charset="0"/>
+                          </a:rPr>
+                          <m:t>1</m:t>
+                        </m:r>
+                      </m:sub>
+                    </m:sSub>
+                    <m:r>
+                      <a:rPr lang="en-US" b="0" i="1" smtClean="0">
+                        <a:latin typeface="Cambria Math" panose="02040503050406030204" pitchFamily="18" charset="0"/>
+                      </a:rPr>
+                      <m:t>+</m:t>
+                    </m:r>
+                    <m:sSub>
+                      <m:sSubPr>
+                        <m:ctrlPr>
+                          <a:rPr lang="en-US" b="0" i="1" smtClean="0">
+                            <a:latin typeface="Cambria Math" panose="02040503050406030204" pitchFamily="18" charset="0"/>
+                          </a:rPr>
+                        </m:ctrlPr>
+                      </m:sSubPr>
+                      <m:e>
+                        <m:r>
+                          <a:rPr lang="en-US" b="0" i="1" smtClean="0">
+                            <a:latin typeface="Cambria Math" panose="02040503050406030204" pitchFamily="18" charset="0"/>
+                          </a:rPr>
+                          <m:t>𝛾</m:t>
+                        </m:r>
+                      </m:e>
+                      <m:sub>
+                        <m:r>
+                          <a:rPr lang="en-US" b="0" i="1" smtClean="0">
+                            <a:latin typeface="Cambria Math" panose="02040503050406030204" pitchFamily="18" charset="0"/>
+                          </a:rPr>
+                          <m:t>2</m:t>
+                        </m:r>
+                      </m:sub>
+                    </m:sSub>
+                    <m:sSub>
+                      <m:sSubPr>
+                        <m:ctrlPr>
+                          <a:rPr lang="en-US" b="0" i="1" smtClean="0">
+                            <a:latin typeface="Cambria Math" panose="02040503050406030204" pitchFamily="18" charset="0"/>
+                          </a:rPr>
+                        </m:ctrlPr>
+                      </m:sSubPr>
+                      <m:e>
+                        <m:r>
+                          <a:rPr lang="en-US" b="0" i="1" smtClean="0">
+                            <a:latin typeface="Cambria Math" panose="02040503050406030204" pitchFamily="18" charset="0"/>
+                          </a:rPr>
+                          <m:t>𝜖</m:t>
+                        </m:r>
+                      </m:e>
+                      <m:sub>
+                        <m:r>
+                          <a:rPr lang="en-US" b="0" i="1" smtClean="0">
+                            <a:latin typeface="Cambria Math" panose="02040503050406030204" pitchFamily="18" charset="0"/>
+                          </a:rPr>
+                          <m:t>2</m:t>
+                        </m:r>
+                      </m:sub>
+                    </m:sSub>
+                  </m:oMath>
                 </a14:m>
+                <a:endParaRPr lang="en-US" b="0" dirty="0"/>
+              </a:p>
+              <a:p>
+                <a14:m>
+                  <m:oMath xmlns:m="http://schemas.openxmlformats.org/officeDocument/2006/math">
+                    <m:r>
+                      <a:rPr lang="en-US" b="0" i="1" smtClean="0">
+                        <a:latin typeface="Cambria Math" panose="02040503050406030204" pitchFamily="18" charset="0"/>
+                      </a:rPr>
+                      <m:t>𝑠𝑡𝑎𝑡</m:t>
+                    </m:r>
+                    <m:sSub>
+                      <m:sSubPr>
+                        <m:ctrlPr>
+                          <a:rPr lang="en-US" b="0" i="1" smtClean="0">
+                            <a:latin typeface="Cambria Math" panose="02040503050406030204" pitchFamily="18" charset="0"/>
+                          </a:rPr>
+                        </m:ctrlPr>
+                      </m:sSubPr>
+                      <m:e>
+                        <m:r>
+                          <a:rPr lang="en-US" b="0" i="1" smtClean="0">
+                            <a:latin typeface="Cambria Math" panose="02040503050406030204" pitchFamily="18" charset="0"/>
+                          </a:rPr>
+                          <m:t>𝑒</m:t>
+                        </m:r>
+                      </m:e>
+                      <m:sub>
+                        <m:r>
+                          <a:rPr lang="en-US" b="0" i="1" smtClean="0">
+                            <a:latin typeface="Cambria Math" panose="02040503050406030204" pitchFamily="18" charset="0"/>
+                          </a:rPr>
+                          <m:t>𝑡</m:t>
+                        </m:r>
+                      </m:sub>
+                    </m:sSub>
+                    <m:r>
+                      <a:rPr lang="en-US" b="0" i="1" smtClean="0">
+                        <a:latin typeface="Cambria Math" panose="02040503050406030204" pitchFamily="18" charset="0"/>
+                      </a:rPr>
+                      <m:t>=</m:t>
+                    </m:r>
+                    <m:sSub>
+                      <m:sSubPr>
+                        <m:ctrlPr>
+                          <a:rPr lang="en-US" b="0" i="1" smtClean="0">
+                            <a:latin typeface="Cambria Math" panose="02040503050406030204" pitchFamily="18" charset="0"/>
+                          </a:rPr>
+                        </m:ctrlPr>
+                      </m:sSubPr>
+                      <m:e>
+                        <m:r>
+                          <a:rPr lang="en-US" b="0" i="1" smtClean="0">
+                            <a:latin typeface="Cambria Math" panose="02040503050406030204" pitchFamily="18" charset="0"/>
+                          </a:rPr>
+                          <m:t>𝛼</m:t>
+                        </m:r>
+                      </m:e>
+                      <m:sub>
+                        <m:r>
+                          <a:rPr lang="en-US" b="0" i="1" smtClean="0">
+                            <a:latin typeface="Cambria Math" panose="02040503050406030204" pitchFamily="18" charset="0"/>
+                          </a:rPr>
+                          <m:t>1</m:t>
+                        </m:r>
+                      </m:sub>
+                    </m:sSub>
+                    <m:sSub>
+                      <m:sSubPr>
+                        <m:ctrlPr>
+                          <a:rPr lang="en-US" b="0" i="1" smtClean="0">
+                            <a:latin typeface="Cambria Math" panose="02040503050406030204" pitchFamily="18" charset="0"/>
+                          </a:rPr>
+                        </m:ctrlPr>
+                      </m:sSubPr>
+                      <m:e>
+                        <m:r>
+                          <a:rPr lang="en-US" b="0" i="1" smtClean="0">
+                            <a:latin typeface="Cambria Math" panose="02040503050406030204" pitchFamily="18" charset="0"/>
+                          </a:rPr>
+                          <m:t>𝑠𝑡𝑎𝑡𝑒</m:t>
+                        </m:r>
+                      </m:e>
+                      <m:sub>
+                        <m:r>
+                          <a:rPr lang="en-US" b="0" i="1" smtClean="0">
+                            <a:latin typeface="Cambria Math" panose="02040503050406030204" pitchFamily="18" charset="0"/>
+                          </a:rPr>
+                          <m:t>𝑡</m:t>
+                        </m:r>
+                        <m:r>
+                          <a:rPr lang="en-US" b="0" i="1" smtClean="0">
+                            <a:latin typeface="Cambria Math" panose="02040503050406030204" pitchFamily="18" charset="0"/>
+                          </a:rPr>
+                          <m:t>−1</m:t>
+                        </m:r>
+                      </m:sub>
+                    </m:sSub>
+                    <m:r>
+                      <a:rPr lang="en-US" b="0" i="1" smtClean="0">
+                        <a:latin typeface="Cambria Math" panose="02040503050406030204" pitchFamily="18" charset="0"/>
+                      </a:rPr>
+                      <m:t>+</m:t>
+                    </m:r>
+                    <m:sSub>
+                      <m:sSubPr>
+                        <m:ctrlPr>
+                          <a:rPr lang="en-US" b="0" i="1" smtClean="0">
+                            <a:latin typeface="Cambria Math" panose="02040503050406030204" pitchFamily="18" charset="0"/>
+                          </a:rPr>
+                        </m:ctrlPr>
+                      </m:sSubPr>
+                      <m:e>
+                        <m:r>
+                          <a:rPr lang="en-US" b="0" i="1" smtClean="0">
+                            <a:latin typeface="Cambria Math" panose="02040503050406030204" pitchFamily="18" charset="0"/>
+                          </a:rPr>
+                          <m:t>𝛼</m:t>
+                        </m:r>
+                      </m:e>
+                      <m:sub>
+                        <m:r>
+                          <a:rPr lang="en-US" b="0" i="1" smtClean="0">
+                            <a:latin typeface="Cambria Math" panose="02040503050406030204" pitchFamily="18" charset="0"/>
+                          </a:rPr>
+                          <m:t>2</m:t>
+                        </m:r>
+                      </m:sub>
+                    </m:sSub>
+                    <m:sSub>
+                      <m:sSubPr>
+                        <m:ctrlPr>
+                          <a:rPr lang="en-US" b="0" i="1" smtClean="0">
+                            <a:latin typeface="Cambria Math" panose="02040503050406030204" pitchFamily="18" charset="0"/>
+                          </a:rPr>
+                        </m:ctrlPr>
+                      </m:sSubPr>
+                      <m:e>
+                        <m:r>
+                          <a:rPr lang="en-US" b="0" i="1" smtClean="0">
+                            <a:latin typeface="Cambria Math" panose="02040503050406030204" pitchFamily="18" charset="0"/>
+                          </a:rPr>
+                          <m:t>𝑠𝑡𝑎𝑡𝑒</m:t>
+                        </m:r>
+                      </m:e>
+                      <m:sub>
+                        <m:r>
+                          <a:rPr lang="en-US" b="0" i="1" smtClean="0">
+                            <a:latin typeface="Cambria Math" panose="02040503050406030204" pitchFamily="18" charset="0"/>
+                          </a:rPr>
+                          <m:t>𝑡</m:t>
+                        </m:r>
+                        <m:r>
+                          <a:rPr lang="en-US" b="0" i="1" smtClean="0">
+                            <a:latin typeface="Cambria Math" panose="02040503050406030204" pitchFamily="18" charset="0"/>
+                          </a:rPr>
+                          <m:t>−2</m:t>
+                        </m:r>
+                      </m:sub>
+                    </m:sSub>
+                    <m:r>
+                      <a:rPr lang="en-US" b="0" i="1" smtClean="0">
+                        <a:latin typeface="Cambria Math" panose="02040503050406030204" pitchFamily="18" charset="0"/>
+                      </a:rPr>
+                      <m:t>+ .. +</m:t>
+                    </m:r>
+                    <m:sSub>
+                      <m:sSubPr>
+                        <m:ctrlPr>
+                          <a:rPr lang="en-US" b="0" i="1" smtClean="0">
+                            <a:latin typeface="Cambria Math" panose="02040503050406030204" pitchFamily="18" charset="0"/>
+                          </a:rPr>
+                        </m:ctrlPr>
+                      </m:sSubPr>
+                      <m:e>
+                        <m:r>
+                          <a:rPr lang="en-US" b="0" i="1" smtClean="0">
+                            <a:latin typeface="Cambria Math" panose="02040503050406030204" pitchFamily="18" charset="0"/>
+                          </a:rPr>
+                          <m:t>𝛽</m:t>
+                        </m:r>
+                      </m:e>
+                      <m:sub>
+                        <m:r>
+                          <a:rPr lang="en-US" b="0" i="1" smtClean="0">
+                            <a:latin typeface="Cambria Math" panose="02040503050406030204" pitchFamily="18" charset="0"/>
+                          </a:rPr>
+                          <m:t>1</m:t>
+                        </m:r>
+                      </m:sub>
+                    </m:sSub>
+                    <m:r>
+                      <a:rPr lang="en-US" b="0" i="1" smtClean="0">
+                        <a:latin typeface="Cambria Math" panose="02040503050406030204" pitchFamily="18" charset="0"/>
+                      </a:rPr>
+                      <m:t>𝑢𝑡𝑖𝑙</m:t>
+                    </m:r>
+                    <m:r>
+                      <a:rPr lang="en-US" b="0" i="1" smtClean="0">
+                        <a:latin typeface="Cambria Math" panose="02040503050406030204" pitchFamily="18" charset="0"/>
+                      </a:rPr>
+                      <m:t>+</m:t>
+                    </m:r>
+                    <m:sSub>
+                      <m:sSubPr>
+                        <m:ctrlPr>
+                          <a:rPr lang="en-US" b="0" i="1" smtClean="0">
+                            <a:latin typeface="Cambria Math" panose="02040503050406030204" pitchFamily="18" charset="0"/>
+                          </a:rPr>
+                        </m:ctrlPr>
+                      </m:sSubPr>
+                      <m:e>
+                        <m:r>
+                          <a:rPr lang="en-US" b="0" i="1" smtClean="0">
+                            <a:latin typeface="Cambria Math" panose="02040503050406030204" pitchFamily="18" charset="0"/>
+                          </a:rPr>
+                          <m:t>𝛾</m:t>
+                        </m:r>
+                      </m:e>
+                      <m:sub>
+                        <m:r>
+                          <a:rPr lang="en-US" b="0" i="1" smtClean="0">
+                            <a:latin typeface="Cambria Math" panose="02040503050406030204" pitchFamily="18" charset="0"/>
+                          </a:rPr>
+                          <m:t>1</m:t>
+                        </m:r>
+                      </m:sub>
+                    </m:sSub>
+                    <m:sSub>
+                      <m:sSubPr>
+                        <m:ctrlPr>
+                          <a:rPr lang="en-US" b="0" i="1" smtClean="0">
+                            <a:latin typeface="Cambria Math" panose="02040503050406030204" pitchFamily="18" charset="0"/>
+                          </a:rPr>
+                        </m:ctrlPr>
+                      </m:sSubPr>
+                      <m:e>
+                        <m:r>
+                          <a:rPr lang="en-US" b="0" i="1" smtClean="0">
+                            <a:latin typeface="Cambria Math" panose="02040503050406030204" pitchFamily="18" charset="0"/>
+                          </a:rPr>
+                          <m:t>𝜖</m:t>
+                        </m:r>
+                      </m:e>
+                      <m:sub>
+                        <m:r>
+                          <a:rPr lang="en-US" b="0" i="1" smtClean="0">
+                            <a:latin typeface="Cambria Math" panose="02040503050406030204" pitchFamily="18" charset="0"/>
+                          </a:rPr>
+                          <m:t>1</m:t>
+                        </m:r>
+                      </m:sub>
+                    </m:sSub>
+                    <m:r>
+                      <a:rPr lang="en-US" b="0" i="1" smtClean="0">
+                        <a:latin typeface="Cambria Math" panose="02040503050406030204" pitchFamily="18" charset="0"/>
+                      </a:rPr>
+                      <m:t>+</m:t>
+                    </m:r>
+                    <m:sSub>
+                      <m:sSubPr>
+                        <m:ctrlPr>
+                          <a:rPr lang="en-US" b="0" i="1" smtClean="0">
+                            <a:latin typeface="Cambria Math" panose="02040503050406030204" pitchFamily="18" charset="0"/>
+                          </a:rPr>
+                        </m:ctrlPr>
+                      </m:sSubPr>
+                      <m:e>
+                        <m:r>
+                          <a:rPr lang="en-US" b="0" i="1" smtClean="0">
+                            <a:latin typeface="Cambria Math" panose="02040503050406030204" pitchFamily="18" charset="0"/>
+                          </a:rPr>
+                          <m:t>𝛾</m:t>
+                        </m:r>
+                      </m:e>
+                      <m:sub>
+                        <m:r>
+                          <a:rPr lang="en-US" b="0" i="1" smtClean="0">
+                            <a:latin typeface="Cambria Math" panose="02040503050406030204" pitchFamily="18" charset="0"/>
+                          </a:rPr>
+                          <m:t>2</m:t>
+                        </m:r>
+                      </m:sub>
+                    </m:sSub>
+                    <m:sSub>
+                      <m:sSubPr>
+                        <m:ctrlPr>
+                          <a:rPr lang="en-US" b="0" i="1" smtClean="0">
+                            <a:latin typeface="Cambria Math" panose="02040503050406030204" pitchFamily="18" charset="0"/>
+                          </a:rPr>
+                        </m:ctrlPr>
+                      </m:sSubPr>
+                      <m:e>
+                        <m:r>
+                          <a:rPr lang="en-US" b="0" i="1" smtClean="0">
+                            <a:latin typeface="Cambria Math" panose="02040503050406030204" pitchFamily="18" charset="0"/>
+                          </a:rPr>
+                          <m:t>𝜖</m:t>
+                        </m:r>
+                      </m:e>
+                      <m:sub>
+                        <m:r>
+                          <a:rPr lang="en-US" b="0" i="1" smtClean="0">
+                            <a:latin typeface="Cambria Math" panose="02040503050406030204" pitchFamily="18" charset="0"/>
+                          </a:rPr>
+                          <m:t>2</m:t>
+                        </m:r>
+                      </m:sub>
+                    </m:sSub>
+                  </m:oMath>
+                </a14:m>
+                <a:endParaRPr lang="en-US" dirty="0"/>
+              </a:p>
+              <a:p>
                 <a:endParaRPr lang="en-US" dirty="0"/>
               </a:p>
             </p:txBody>
           </p:sp>
         </mc:Choice>
-        <mc:Fallback xmlns="">
+        <mc:Fallback>
           <p:sp>
             <p:nvSpPr>
               <p:cNvPr id="3" name="Content Placeholder 2">
@@ -4359,7 +5860,7 @@
               <a:blipFill>
                 <a:blip r:embed="rId2"/>
                 <a:stretch>
-                  <a:fillRect l="-1206" t="-2326"/>
+                  <a:fillRect l="-1206" t="-2616"/>
                 </a:stretch>
               </a:blipFill>
             </p:spPr>
@@ -4391,7 +5892,7 @@
 </p:sld>
 </file>
 
-<file path=ppt/slides/slide5.xml><?xml version="1.0" encoding="utf-8"?>
+<file path=ppt/slides/slide7.xml><?xml version="1.0" encoding="utf-8"?>
 <p:sld xmlns:a="http://schemas.openxmlformats.org/drawingml/2006/main" xmlns:r="http://schemas.openxmlformats.org/officeDocument/2006/relationships" xmlns:p="http://schemas.openxmlformats.org/presentationml/2006/main">
   <p:cSld>
     <p:spTree>
@@ -4432,7 +5933,7 @@
             <a:pPr algn="ctr"/>
             <a:r>
               <a:rPr lang="en-US" dirty="0"/>
-              <a:t>Data used for modeling</a:t>
+              <a:t>Data Coverage</a:t>
             </a:r>
           </a:p>
         </p:txBody>
@@ -4577,7 +6078,7 @@
 </p:sld>
 </file>
 
-<file path=ppt/slides/slide6.xml><?xml version="1.0" encoding="utf-8"?>
+<file path=ppt/slides/slide8.xml><?xml version="1.0" encoding="utf-8"?>
 <p:sld xmlns:a="http://schemas.openxmlformats.org/drawingml/2006/main" xmlns:r="http://schemas.openxmlformats.org/officeDocument/2006/relationships" xmlns:p="http://schemas.openxmlformats.org/presentationml/2006/main">
   <p:cSld>
     <p:spTree>
@@ -4618,7 +6119,7 @@
             <a:pPr algn="ctr"/>
             <a:r>
               <a:rPr lang="en-US" dirty="0"/>
-              <a:t>Data used for modeling</a:t>
+              <a:t>Data Coverage</a:t>
             </a:r>
           </a:p>
         </p:txBody>
@@ -4730,266 +6231,6 @@
 </p:sld>
 </file>
 
-<file path=ppt/slides/slide7.xml><?xml version="1.0" encoding="utf-8"?>
-<p:sld xmlns:a="http://schemas.openxmlformats.org/drawingml/2006/main" xmlns:r="http://schemas.openxmlformats.org/officeDocument/2006/relationships" xmlns:p="http://schemas.openxmlformats.org/presentationml/2006/main">
-  <p:cSld>
-    <p:spTree>
-      <p:nvGrpSpPr>
-        <p:cNvPr id="1" name=""/>
-        <p:cNvGrpSpPr/>
-        <p:nvPr/>
-      </p:nvGrpSpPr>
-      <p:grpSpPr>
-        <a:xfrm>
-          <a:off x="0" y="0"/>
-          <a:ext cx="0" cy="0"/>
-          <a:chOff x="0" y="0"/>
-          <a:chExt cx="0" cy="0"/>
-        </a:xfrm>
-      </p:grpSpPr>
-      <p:sp>
-        <p:nvSpPr>
-          <p:cNvPr id="2" name="Title 1">
-            <a:extLst>
-              <a:ext uri="{FF2B5EF4-FFF2-40B4-BE49-F238E27FC236}">
-                <a16:creationId xmlns:a16="http://schemas.microsoft.com/office/drawing/2014/main" id="{AF51662E-BB24-39FA-80DD-CD9E87045A83}"/>
-              </a:ext>
-            </a:extLst>
-          </p:cNvPr>
-          <p:cNvSpPr>
-            <a:spLocks noGrp="1"/>
-          </p:cNvSpPr>
-          <p:nvPr>
-            <p:ph type="title"/>
-          </p:nvPr>
-        </p:nvSpPr>
-        <p:spPr/>
-        <p:txBody>
-          <a:bodyPr/>
-          <a:lstStyle/>
-          <a:p>
-            <a:r>
-              <a:rPr lang="en-US" dirty="0"/>
-              <a:t>How are we modeling</a:t>
-            </a:r>
-          </a:p>
-        </p:txBody>
-      </p:sp>
-      <p:sp>
-        <p:nvSpPr>
-          <p:cNvPr id="3" name="Content Placeholder 2">
-            <a:extLst>
-              <a:ext uri="{FF2B5EF4-FFF2-40B4-BE49-F238E27FC236}">
-                <a16:creationId xmlns:a16="http://schemas.microsoft.com/office/drawing/2014/main" id="{9DAAC8C5-1096-C209-3D6A-2DB2B985B468}"/>
-              </a:ext>
-            </a:extLst>
-          </p:cNvPr>
-          <p:cNvSpPr>
-            <a:spLocks noGrp="1"/>
-          </p:cNvSpPr>
-          <p:nvPr>
-            <p:ph idx="1"/>
-          </p:nvPr>
-        </p:nvSpPr>
-        <p:spPr/>
-        <p:txBody>
-          <a:bodyPr/>
-          <a:lstStyle/>
-          <a:p>
-            <a:r>
-              <a:rPr lang="en-US" dirty="0"/>
-              <a:t>We are going to estimate various auto-correlation lags and moving average parameters to check if we get good model</a:t>
-            </a:r>
-          </a:p>
-          <a:p>
-            <a:endParaRPr lang="en-US" dirty="0"/>
-          </a:p>
-          <a:p>
-            <a:endParaRPr lang="en-US" dirty="0"/>
-          </a:p>
-          <a:p>
-            <a:r>
-              <a:rPr lang="en-US" dirty="0"/>
-              <a:t>Order = (</a:t>
-            </a:r>
-            <a:r>
-              <a:rPr lang="en-US" dirty="0" err="1"/>
-              <a:t>p,d,q</a:t>
-            </a:r>
-            <a:r>
-              <a:rPr lang="en-US" dirty="0"/>
-              <a:t>) </a:t>
-            </a:r>
-            <a:r>
-              <a:rPr lang="en-US" dirty="0">
-                <a:sym typeface="Wingdings" pitchFamily="2" charset="2"/>
-              </a:rPr>
-              <a:t> where p : auto-correlation lag, q = moving average of errors, d = order of differentiation for the data to be stationary over time</a:t>
-            </a:r>
-            <a:endParaRPr lang="en-US" dirty="0"/>
-          </a:p>
-        </p:txBody>
-      </p:sp>
-      <p:pic>
-        <p:nvPicPr>
-          <p:cNvPr id="4" name="Content Placeholder 6">
-            <a:extLst>
-              <a:ext uri="{FF2B5EF4-FFF2-40B4-BE49-F238E27FC236}">
-                <a16:creationId xmlns:a16="http://schemas.microsoft.com/office/drawing/2014/main" id="{E2E657DC-F0E7-C9C4-222D-4CA8FC94A174}"/>
-              </a:ext>
-            </a:extLst>
-          </p:cNvPr>
-          <p:cNvPicPr>
-            <a:picLocks noChangeAspect="1"/>
-          </p:cNvPicPr>
-          <p:nvPr/>
-        </p:nvPicPr>
-        <p:blipFill>
-          <a:blip r:embed="rId2"/>
-          <a:stretch>
-            <a:fillRect/>
-          </a:stretch>
-        </p:blipFill>
-        <p:spPr>
-          <a:xfrm>
-            <a:off x="1161473" y="2811535"/>
-            <a:ext cx="8623300" cy="495300"/>
-          </a:xfrm>
-          <a:prstGeom prst="rect">
-            <a:avLst/>
-          </a:prstGeom>
-        </p:spPr>
-      </p:pic>
-    </p:spTree>
-    <p:extLst>
-      <p:ext uri="{BB962C8B-B14F-4D97-AF65-F5344CB8AC3E}">
-        <p14:creationId xmlns:p14="http://schemas.microsoft.com/office/powerpoint/2010/main" val="1887907696"/>
-      </p:ext>
-    </p:extLst>
-  </p:cSld>
-  <p:clrMapOvr>
-    <a:masterClrMapping/>
-  </p:clrMapOvr>
-</p:sld>
-</file>
-
-<file path=ppt/slides/slide8.xml><?xml version="1.0" encoding="utf-8"?>
-<p:sld xmlns:a="http://schemas.openxmlformats.org/drawingml/2006/main" xmlns:r="http://schemas.openxmlformats.org/officeDocument/2006/relationships" xmlns:p="http://schemas.openxmlformats.org/presentationml/2006/main">
-  <p:cSld>
-    <p:spTree>
-      <p:nvGrpSpPr>
-        <p:cNvPr id="1" name=""/>
-        <p:cNvGrpSpPr/>
-        <p:nvPr/>
-      </p:nvGrpSpPr>
-      <p:grpSpPr>
-        <a:xfrm>
-          <a:off x="0" y="0"/>
-          <a:ext cx="0" cy="0"/>
-          <a:chOff x="0" y="0"/>
-          <a:chExt cx="0" cy="0"/>
-        </a:xfrm>
-      </p:grpSpPr>
-      <p:sp>
-        <p:nvSpPr>
-          <p:cNvPr id="2" name="Title 1">
-            <a:extLst>
-              <a:ext uri="{FF2B5EF4-FFF2-40B4-BE49-F238E27FC236}">
-                <a16:creationId xmlns:a16="http://schemas.microsoft.com/office/drawing/2014/main" id="{873786AC-7029-A72B-F3D0-C7968D287445}"/>
-              </a:ext>
-            </a:extLst>
-          </p:cNvPr>
-          <p:cNvSpPr>
-            <a:spLocks noGrp="1"/>
-          </p:cNvSpPr>
-          <p:nvPr>
-            <p:ph type="title"/>
-          </p:nvPr>
-        </p:nvSpPr>
-        <p:spPr/>
-        <p:txBody>
-          <a:bodyPr/>
-          <a:lstStyle/>
-          <a:p>
-            <a:pPr algn="ctr"/>
-            <a:r>
-              <a:rPr lang="en-US" dirty="0"/>
-              <a:t>Some introductory result</a:t>
-            </a:r>
-          </a:p>
-        </p:txBody>
-      </p:sp>
-      <p:sp>
-        <p:nvSpPr>
-          <p:cNvPr id="3" name="Content Placeholder 2">
-            <a:extLst>
-              <a:ext uri="{FF2B5EF4-FFF2-40B4-BE49-F238E27FC236}">
-                <a16:creationId xmlns:a16="http://schemas.microsoft.com/office/drawing/2014/main" id="{76101D1C-C407-1FC5-F504-93BB9AF4110B}"/>
-              </a:ext>
-            </a:extLst>
-          </p:cNvPr>
-          <p:cNvSpPr>
-            <a:spLocks noGrp="1"/>
-          </p:cNvSpPr>
-          <p:nvPr>
-            <p:ph idx="1"/>
-          </p:nvPr>
-        </p:nvSpPr>
-        <p:spPr/>
-        <p:txBody>
-          <a:bodyPr/>
-          <a:lstStyle/>
-          <a:p>
-            <a:endParaRPr lang="en-US" dirty="0"/>
-          </a:p>
-          <a:p>
-            <a:endParaRPr lang="en-US" dirty="0"/>
-          </a:p>
-        </p:txBody>
-      </p:sp>
-      <p:pic>
-        <p:nvPicPr>
-          <p:cNvPr id="5" name="Picture 4" descr="A screenshot of a computer&#10;&#10;Description automatically generated with low confidence">
-            <a:extLst>
-              <a:ext uri="{FF2B5EF4-FFF2-40B4-BE49-F238E27FC236}">
-                <a16:creationId xmlns:a16="http://schemas.microsoft.com/office/drawing/2014/main" id="{DEF96C1C-F728-C16B-7671-7A6589F65143}"/>
-              </a:ext>
-            </a:extLst>
-          </p:cNvPr>
-          <p:cNvPicPr>
-            <a:picLocks noChangeAspect="1"/>
-          </p:cNvPicPr>
-          <p:nvPr/>
-        </p:nvPicPr>
-        <p:blipFill>
-          <a:blip r:embed="rId2"/>
-          <a:stretch>
-            <a:fillRect/>
-          </a:stretch>
-        </p:blipFill>
-        <p:spPr>
-          <a:xfrm>
-            <a:off x="2409264" y="2120275"/>
-            <a:ext cx="7772400" cy="4262876"/>
-          </a:xfrm>
-          <a:prstGeom prst="rect">
-            <a:avLst/>
-          </a:prstGeom>
-        </p:spPr>
-      </p:pic>
-    </p:spTree>
-    <p:extLst>
-      <p:ext uri="{BB962C8B-B14F-4D97-AF65-F5344CB8AC3E}">
-        <p14:creationId xmlns:p14="http://schemas.microsoft.com/office/powerpoint/2010/main" val="2692328184"/>
-      </p:ext>
-    </p:extLst>
-  </p:cSld>
-  <p:clrMapOvr>
-    <a:masterClrMapping/>
-  </p:clrMapOvr>
-</p:sld>
-</file>
-
 <file path=ppt/slides/slide9.xml><?xml version="1.0" encoding="utf-8"?>
 <p:sld xmlns:a="http://schemas.openxmlformats.org/drawingml/2006/main" xmlns:r="http://schemas.openxmlformats.org/officeDocument/2006/relationships" xmlns:p="http://schemas.openxmlformats.org/presentationml/2006/main">
   <p:cSld>
@@ -5012,7 +6253,7 @@
           <p:cNvPr id="2" name="Title 1">
             <a:extLst>
               <a:ext uri="{FF2B5EF4-FFF2-40B4-BE49-F238E27FC236}">
-                <a16:creationId xmlns:a16="http://schemas.microsoft.com/office/drawing/2014/main" id="{1B090EEE-3A3D-A038-4857-31BDA990461D}"/>
+                <a16:creationId xmlns:a16="http://schemas.microsoft.com/office/drawing/2014/main" id="{1836CDE0-DCF9-EF71-1B6C-D0E9E4D9F33F}"/>
               </a:ext>
             </a:extLst>
           </p:cNvPr>
@@ -5030,44 +6271,99 @@
           <a:p>
             <a:r>
               <a:rPr lang="en-US" dirty="0"/>
-              <a:t>Introductory Results</a:t>
+              <a:t>Timeline of load across the system</a:t>
             </a:r>
           </a:p>
         </p:txBody>
       </p:sp>
       <p:pic>
         <p:nvPicPr>
-          <p:cNvPr id="5" name="Content Placeholder 4" descr="A screenshot of a computer&#10;&#10;Description automatically generated with low confidence">
-            <a:extLst>
-              <a:ext uri="{FF2B5EF4-FFF2-40B4-BE49-F238E27FC236}">
-                <a16:creationId xmlns:a16="http://schemas.microsoft.com/office/drawing/2014/main" id="{1EF60470-88E2-7E8F-3479-21E2A5E4DC5C}"/>
+          <p:cNvPr id="4098" name="Picture 2">
+            <a:extLst>
+              <a:ext uri="{FF2B5EF4-FFF2-40B4-BE49-F238E27FC236}">
+                <a16:creationId xmlns:a16="http://schemas.microsoft.com/office/drawing/2014/main" id="{EF56B79D-87FD-CE60-87AD-A2FE1AD4F750}"/>
               </a:ext>
             </a:extLst>
           </p:cNvPr>
           <p:cNvPicPr>
-            <a:picLocks noGrp="1" noChangeAspect="1"/>
+            <a:picLocks noGrp="1" noChangeAspect="1" noChangeArrowheads="1"/>
           </p:cNvPicPr>
           <p:nvPr>
             <p:ph idx="1"/>
           </p:nvPr>
         </p:nvPicPr>
         <p:blipFill>
-          <a:blip r:embed="rId2"/>
+          <a:blip r:embed="rId2">
+            <a:extLst>
+              <a:ext uri="{28A0092B-C50C-407E-A947-70E740481C1C}">
+                <a14:useLocalDpi xmlns:a14="http://schemas.microsoft.com/office/drawing/2010/main" val="0"/>
+              </a:ext>
+            </a:extLst>
+          </a:blip>
+          <a:srcRect/>
           <a:stretch>
             <a:fillRect/>
           </a:stretch>
         </p:blipFill>
+        <p:spPr bwMode="auto">
+          <a:xfrm>
+            <a:off x="1701800" y="1950244"/>
+            <a:ext cx="8788400" cy="4102100"/>
+          </a:xfrm>
+          <a:prstGeom prst="rect">
+            <a:avLst/>
+          </a:prstGeom>
+          <a:noFill/>
+          <a:extLst>
+            <a:ext uri="{909E8E84-426E-40DD-AFC4-6F175D3DCCD1}">
+              <a14:hiddenFill xmlns:a14="http://schemas.microsoft.com/office/drawing/2010/main">
+                <a:solidFill>
+                  <a:srgbClr val="FFFFFF"/>
+                </a:solidFill>
+              </a14:hiddenFill>
+            </a:ext>
+          </a:extLst>
+        </p:spPr>
+      </p:pic>
+      <p:sp>
+        <p:nvSpPr>
+          <p:cNvPr id="4" name="TextBox 3">
+            <a:extLst>
+              <a:ext uri="{FF2B5EF4-FFF2-40B4-BE49-F238E27FC236}">
+                <a16:creationId xmlns:a16="http://schemas.microsoft.com/office/drawing/2014/main" id="{A2740A87-567A-4C78-5DD1-902385FA364A}"/>
+              </a:ext>
+            </a:extLst>
+          </p:cNvPr>
+          <p:cNvSpPr txBox="1"/>
+          <p:nvPr/>
+        </p:nvSpPr>
         <p:spPr>
           <a:xfrm>
-            <a:off x="2351608" y="1825625"/>
-            <a:ext cx="7488783" cy="4351338"/>
+            <a:off x="2975020" y="6362163"/>
+            <a:ext cx="6658377" cy="369332"/>
           </a:xfrm>
+          <a:prstGeom prst="rect">
+            <a:avLst/>
+          </a:prstGeom>
+          <a:noFill/>
         </p:spPr>
-      </p:pic>
+        <p:txBody>
+          <a:bodyPr wrap="square" rtlCol="0">
+            <a:spAutoFit/>
+          </a:bodyPr>
+          <a:lstStyle/>
+          <a:p>
+            <a:r>
+              <a:rPr lang="en-US" dirty="0"/>
+              <a:t>Mem: Blue , CPU: green</a:t>
+            </a:r>
+          </a:p>
+        </p:txBody>
+      </p:sp>
     </p:spTree>
     <p:extLst>
       <p:ext uri="{BB962C8B-B14F-4D97-AF65-F5344CB8AC3E}">
-        <p14:creationId xmlns:p14="http://schemas.microsoft.com/office/powerpoint/2010/main" val="2365487097"/>
+        <p14:creationId xmlns:p14="http://schemas.microsoft.com/office/powerpoint/2010/main" val="650285439"/>
       </p:ext>
     </p:extLst>
   </p:cSld>

</xml_diff>

<commit_message>
Added C-means to the data
</commit_message>
<xml_diff>
--- a/ARIMAX.pptx
+++ b/ARIMAX.pptx
@@ -25,6 +25,8 @@
     <p:sldId id="266" r:id="rId19"/>
     <p:sldId id="267" r:id="rId20"/>
     <p:sldId id="268" r:id="rId21"/>
+    <p:sldId id="277" r:id="rId22"/>
+    <p:sldId id="278" r:id="rId23"/>
   </p:sldIdLst>
   <p:sldSz cx="12192000" cy="6858000"/>
   <p:notesSz cx="6858000" cy="9144000"/>
@@ -162,6 +164,12 @@
             <p14:sldId id="268"/>
           </p14:sldIdLst>
         </p14:section>
+        <p14:section name="Updated Method" id="{23A6401E-9B28-F841-964C-D63FFF1CB988}">
+          <p14:sldIdLst>
+            <p14:sldId id="277"/>
+            <p14:sldId id="278"/>
+          </p14:sldIdLst>
+        </p14:section>
       </p14:sectionLst>
     </p:ext>
     <p:ext uri="{EFAFB233-063F-42B5-8137-9DF3F51BA10A}">
@@ -318,7 +326,7 @@
           <a:p>
             <a:fld id="{D6B6AB59-4BF5-3945-BEF3-0E0018AC9BBC}" type="datetimeFigureOut">
               <a:rPr lang="en-US" smtClean="0"/>
-              <a:t>6/7/23</a:t>
+              <a:t>6/28/23</a:t>
             </a:fld>
             <a:endParaRPr lang="en-US"/>
           </a:p>
@@ -516,7 +524,7 @@
           <a:p>
             <a:fld id="{D6B6AB59-4BF5-3945-BEF3-0E0018AC9BBC}" type="datetimeFigureOut">
               <a:rPr lang="en-US" smtClean="0"/>
-              <a:t>6/7/23</a:t>
+              <a:t>6/28/23</a:t>
             </a:fld>
             <a:endParaRPr lang="en-US"/>
           </a:p>
@@ -724,7 +732,7 @@
           <a:p>
             <a:fld id="{D6B6AB59-4BF5-3945-BEF3-0E0018AC9BBC}" type="datetimeFigureOut">
               <a:rPr lang="en-US" smtClean="0"/>
-              <a:t>6/7/23</a:t>
+              <a:t>6/28/23</a:t>
             </a:fld>
             <a:endParaRPr lang="en-US"/>
           </a:p>
@@ -922,7 +930,7 @@
           <a:p>
             <a:fld id="{D6B6AB59-4BF5-3945-BEF3-0E0018AC9BBC}" type="datetimeFigureOut">
               <a:rPr lang="en-US" smtClean="0"/>
-              <a:t>6/7/23</a:t>
+              <a:t>6/28/23</a:t>
             </a:fld>
             <a:endParaRPr lang="en-US"/>
           </a:p>
@@ -1197,7 +1205,7 @@
           <a:p>
             <a:fld id="{D6B6AB59-4BF5-3945-BEF3-0E0018AC9BBC}" type="datetimeFigureOut">
               <a:rPr lang="en-US" smtClean="0"/>
-              <a:t>6/7/23</a:t>
+              <a:t>6/28/23</a:t>
             </a:fld>
             <a:endParaRPr lang="en-US"/>
           </a:p>
@@ -1462,7 +1470,7 @@
           <a:p>
             <a:fld id="{D6B6AB59-4BF5-3945-BEF3-0E0018AC9BBC}" type="datetimeFigureOut">
               <a:rPr lang="en-US" smtClean="0"/>
-              <a:t>6/7/23</a:t>
+              <a:t>6/28/23</a:t>
             </a:fld>
             <a:endParaRPr lang="en-US"/>
           </a:p>
@@ -1874,7 +1882,7 @@
           <a:p>
             <a:fld id="{D6B6AB59-4BF5-3945-BEF3-0E0018AC9BBC}" type="datetimeFigureOut">
               <a:rPr lang="en-US" smtClean="0"/>
-              <a:t>6/7/23</a:t>
+              <a:t>6/28/23</a:t>
             </a:fld>
             <a:endParaRPr lang="en-US"/>
           </a:p>
@@ -2015,7 +2023,7 @@
           <a:p>
             <a:fld id="{D6B6AB59-4BF5-3945-BEF3-0E0018AC9BBC}" type="datetimeFigureOut">
               <a:rPr lang="en-US" smtClean="0"/>
-              <a:t>6/7/23</a:t>
+              <a:t>6/28/23</a:t>
             </a:fld>
             <a:endParaRPr lang="en-US"/>
           </a:p>
@@ -2128,7 +2136,7 @@
           <a:p>
             <a:fld id="{D6B6AB59-4BF5-3945-BEF3-0E0018AC9BBC}" type="datetimeFigureOut">
               <a:rPr lang="en-US" smtClean="0"/>
-              <a:t>6/7/23</a:t>
+              <a:t>6/28/23</a:t>
             </a:fld>
             <a:endParaRPr lang="en-US"/>
           </a:p>
@@ -2439,7 +2447,7 @@
           <a:p>
             <a:fld id="{D6B6AB59-4BF5-3945-BEF3-0E0018AC9BBC}" type="datetimeFigureOut">
               <a:rPr lang="en-US" smtClean="0"/>
-              <a:t>6/7/23</a:t>
+              <a:t>6/28/23</a:t>
             </a:fld>
             <a:endParaRPr lang="en-US"/>
           </a:p>
@@ -2727,7 +2735,7 @@
           <a:p>
             <a:fld id="{D6B6AB59-4BF5-3945-BEF3-0E0018AC9BBC}" type="datetimeFigureOut">
               <a:rPr lang="en-US" smtClean="0"/>
-              <a:t>6/7/23</a:t>
+              <a:t>6/28/23</a:t>
             </a:fld>
             <a:endParaRPr lang="en-US"/>
           </a:p>
@@ -2968,7 +2976,7 @@
           <a:p>
             <a:fld id="{D6B6AB59-4BF5-3945-BEF3-0E0018AC9BBC}" type="datetimeFigureOut">
               <a:rPr lang="en-US" smtClean="0"/>
-              <a:t>6/7/23</a:t>
+              <a:t>6/28/23</a:t>
             </a:fld>
             <a:endParaRPr lang="en-US"/>
           </a:p>
@@ -4808,6 +4816,198 @@
 </p:sld>
 </file>
 
+<file path=ppt/slides/slide21.xml><?xml version="1.0" encoding="utf-8"?>
+<p:sld xmlns:a="http://schemas.openxmlformats.org/drawingml/2006/main" xmlns:r="http://schemas.openxmlformats.org/officeDocument/2006/relationships" xmlns:p="http://schemas.openxmlformats.org/presentationml/2006/main">
+  <p:cSld>
+    <p:spTree>
+      <p:nvGrpSpPr>
+        <p:cNvPr id="1" name=""/>
+        <p:cNvGrpSpPr/>
+        <p:nvPr/>
+      </p:nvGrpSpPr>
+      <p:grpSpPr>
+        <a:xfrm>
+          <a:off x="0" y="0"/>
+          <a:ext cx="0" cy="0"/>
+          <a:chOff x="0" y="0"/>
+          <a:chExt cx="0" cy="0"/>
+        </a:xfrm>
+      </p:grpSpPr>
+      <p:sp>
+        <p:nvSpPr>
+          <p:cNvPr id="2" name="Title 1">
+            <a:extLst>
+              <a:ext uri="{FF2B5EF4-FFF2-40B4-BE49-F238E27FC236}">
+                <a16:creationId xmlns:a16="http://schemas.microsoft.com/office/drawing/2014/main" id="{65DF47DD-DA80-D803-D832-50893B1585A6}"/>
+              </a:ext>
+            </a:extLst>
+          </p:cNvPr>
+          <p:cNvSpPr>
+            <a:spLocks noGrp="1"/>
+          </p:cNvSpPr>
+          <p:nvPr>
+            <p:ph type="title"/>
+          </p:nvPr>
+        </p:nvSpPr>
+        <p:spPr/>
+        <p:txBody>
+          <a:bodyPr/>
+          <a:lstStyle/>
+          <a:p>
+            <a:r>
+              <a:rPr lang="en-US" dirty="0"/>
+              <a:t>Re-modeling our approach</a:t>
+            </a:r>
+          </a:p>
+        </p:txBody>
+      </p:sp>
+      <p:sp>
+        <p:nvSpPr>
+          <p:cNvPr id="3" name="Content Placeholder 2">
+            <a:extLst>
+              <a:ext uri="{FF2B5EF4-FFF2-40B4-BE49-F238E27FC236}">
+                <a16:creationId xmlns:a16="http://schemas.microsoft.com/office/drawing/2014/main" id="{58485C1B-88E2-0BE8-7B6B-03A3C6143D68}"/>
+              </a:ext>
+            </a:extLst>
+          </p:cNvPr>
+          <p:cNvSpPr>
+            <a:spLocks noGrp="1"/>
+          </p:cNvSpPr>
+          <p:nvPr>
+            <p:ph idx="1"/>
+          </p:nvPr>
+        </p:nvSpPr>
+        <p:spPr/>
+        <p:txBody>
+          <a:bodyPr/>
+          <a:lstStyle/>
+          <a:p>
+            <a:r>
+              <a:rPr lang="en-US" dirty="0"/>
+              <a:t>Use C-means clustering of the CPU load using the differential value</a:t>
+            </a:r>
+          </a:p>
+          <a:p>
+            <a:pPr lvl="1"/>
+            <a:r>
+              <a:rPr lang="en-US" dirty="0"/>
+              <a:t>This allows us to create models for different type of load and create model for each of them</a:t>
+            </a:r>
+          </a:p>
+          <a:p>
+            <a:pPr lvl="1"/>
+            <a:r>
+              <a:rPr lang="en-US" dirty="0"/>
+              <a:t>Use the observed values for creating state transitions</a:t>
+            </a:r>
+          </a:p>
+          <a:p>
+            <a:r>
+              <a:rPr lang="en-US" dirty="0"/>
+              <a:t>Use ARMA or Fuzzy logic to calculate the predicted value for each cluster</a:t>
+            </a:r>
+          </a:p>
+          <a:p>
+            <a:r>
+              <a:rPr lang="en-US" dirty="0"/>
+              <a:t>Use the probabilities for weighing the outcome and then create a average prediction values</a:t>
+            </a:r>
+          </a:p>
+        </p:txBody>
+      </p:sp>
+    </p:spTree>
+    <p:extLst>
+      <p:ext uri="{BB962C8B-B14F-4D97-AF65-F5344CB8AC3E}">
+        <p14:creationId xmlns:p14="http://schemas.microsoft.com/office/powerpoint/2010/main" val="611005565"/>
+      </p:ext>
+    </p:extLst>
+  </p:cSld>
+  <p:clrMapOvr>
+    <a:masterClrMapping/>
+  </p:clrMapOvr>
+</p:sld>
+</file>
+
+<file path=ppt/slides/slide22.xml><?xml version="1.0" encoding="utf-8"?>
+<p:sld xmlns:a="http://schemas.openxmlformats.org/drawingml/2006/main" xmlns:r="http://schemas.openxmlformats.org/officeDocument/2006/relationships" xmlns:p="http://schemas.openxmlformats.org/presentationml/2006/main">
+  <p:cSld>
+    <p:spTree>
+      <p:nvGrpSpPr>
+        <p:cNvPr id="1" name=""/>
+        <p:cNvGrpSpPr/>
+        <p:nvPr/>
+      </p:nvGrpSpPr>
+      <p:grpSpPr>
+        <a:xfrm>
+          <a:off x="0" y="0"/>
+          <a:ext cx="0" cy="0"/>
+          <a:chOff x="0" y="0"/>
+          <a:chExt cx="0" cy="0"/>
+        </a:xfrm>
+      </p:grpSpPr>
+      <p:sp>
+        <p:nvSpPr>
+          <p:cNvPr id="2" name="Title 1">
+            <a:extLst>
+              <a:ext uri="{FF2B5EF4-FFF2-40B4-BE49-F238E27FC236}">
+                <a16:creationId xmlns:a16="http://schemas.microsoft.com/office/drawing/2014/main" id="{1944C090-DDE3-C8DA-BFF5-A615F10FAA3F}"/>
+              </a:ext>
+            </a:extLst>
+          </p:cNvPr>
+          <p:cNvSpPr>
+            <a:spLocks noGrp="1"/>
+          </p:cNvSpPr>
+          <p:nvPr>
+            <p:ph type="title"/>
+          </p:nvPr>
+        </p:nvSpPr>
+        <p:spPr/>
+        <p:txBody>
+          <a:bodyPr/>
+          <a:lstStyle/>
+          <a:p>
+            <a:endParaRPr lang="en-US" dirty="0"/>
+          </a:p>
+        </p:txBody>
+      </p:sp>
+      <p:sp>
+        <p:nvSpPr>
+          <p:cNvPr id="3" name="Content Placeholder 2">
+            <a:extLst>
+              <a:ext uri="{FF2B5EF4-FFF2-40B4-BE49-F238E27FC236}">
+                <a16:creationId xmlns:a16="http://schemas.microsoft.com/office/drawing/2014/main" id="{F20A78DF-E957-035A-741D-F5A66737CA7B}"/>
+              </a:ext>
+            </a:extLst>
+          </p:cNvPr>
+          <p:cNvSpPr>
+            <a:spLocks noGrp="1"/>
+          </p:cNvSpPr>
+          <p:nvPr>
+            <p:ph idx="1"/>
+          </p:nvPr>
+        </p:nvSpPr>
+        <p:spPr/>
+        <p:txBody>
+          <a:bodyPr/>
+          <a:lstStyle/>
+          <a:p>
+            <a:endParaRPr lang="en-US"/>
+          </a:p>
+        </p:txBody>
+      </p:sp>
+    </p:spTree>
+    <p:extLst>
+      <p:ext uri="{BB962C8B-B14F-4D97-AF65-F5344CB8AC3E}">
+        <p14:creationId xmlns:p14="http://schemas.microsoft.com/office/powerpoint/2010/main" val="1955580905"/>
+      </p:ext>
+    </p:extLst>
+  </p:cSld>
+  <p:clrMapOvr>
+    <a:masterClrMapping/>
+  </p:clrMapOvr>
+</p:sld>
+</file>
+
 <file path=ppt/slides/slide3.xml><?xml version="1.0" encoding="utf-8"?>
 <p:sld xmlns:a="http://schemas.openxmlformats.org/drawingml/2006/main" xmlns:r="http://schemas.openxmlformats.org/officeDocument/2006/relationships" xmlns:p="http://schemas.openxmlformats.org/presentationml/2006/main" show="0">
   <p:cSld>
@@ -5150,8 +5350,8 @@
           </a:p>
         </p:txBody>
       </p:sp>
-      <mc:AlternateContent xmlns:mc="http://schemas.openxmlformats.org/markup-compatibility/2006">
-        <mc:Choice xmlns:a14="http://schemas.microsoft.com/office/drawing/2010/main" Requires="a14">
+      <mc:AlternateContent xmlns:mc="http://schemas.openxmlformats.org/markup-compatibility/2006" xmlns:a14="http://schemas.microsoft.com/office/drawing/2010/main">
+        <mc:Choice Requires="a14">
           <p:sp>
             <p:nvSpPr>
               <p:cNvPr id="3" name="Content Placeholder 2">
@@ -5839,7 +6039,7 @@
             </p:txBody>
           </p:sp>
         </mc:Choice>
-        <mc:Fallback>
+        <mc:Fallback xmlns="">
           <p:sp>
             <p:nvSpPr>
               <p:cNvPr id="3" name="Content Placeholder 2">

</xml_diff>